<commit_message>
updating example model to include 6 irrigated cells, and 6 SUP/IRR wells
</commit_message>
<xml_diff>
--- a/Examples/AgOptions/Options.pptx
+++ b/Examples/AgOptions/Options.pptx
@@ -6,6 +6,8 @@
   </p:sldMasterIdLst>
   <p:sldIdLst>
     <p:sldId id="256" r:id="rId2"/>
+    <p:sldId id="257" r:id="rId3"/>
+    <p:sldId id="258" r:id="rId4"/>
   </p:sldIdLst>
   <p:sldSz cx="12192000" cy="6858000"/>
   <p:notesSz cx="6858000" cy="9144000"/>
@@ -104,6 +106,11 @@
       </a:defRPr>
     </a:lvl9pPr>
   </p:defaultTextStyle>
+  <p:extLst>
+    <p:ext uri="{EFAFB233-063F-42B5-8137-9DF3F51BA10A}">
+      <p15:sldGuideLst xmlns:p15="http://schemas.microsoft.com/office/powerpoint/2012/main"/>
+    </p:ext>
+  </p:extLst>
 </p:presentation>
 </file>
 
@@ -238,7 +245,7 @@
           <a:p>
             <a:fld id="{652F1E81-1D68-4626-9ECC-923EDADFDCD3}" type="datetimeFigureOut">
               <a:rPr lang="en-US" smtClean="0"/>
-              <a:t>10/2/2017</a:t>
+              <a:t>10/20/2017</a:t>
             </a:fld>
             <a:endParaRPr lang="en-US"/>
           </a:p>
@@ -408,7 +415,7 @@
           <a:p>
             <a:fld id="{652F1E81-1D68-4626-9ECC-923EDADFDCD3}" type="datetimeFigureOut">
               <a:rPr lang="en-US" smtClean="0"/>
-              <a:t>10/2/2017</a:t>
+              <a:t>10/20/2017</a:t>
             </a:fld>
             <a:endParaRPr lang="en-US"/>
           </a:p>
@@ -588,7 +595,7 @@
           <a:p>
             <a:fld id="{652F1E81-1D68-4626-9ECC-923EDADFDCD3}" type="datetimeFigureOut">
               <a:rPr lang="en-US" smtClean="0"/>
-              <a:t>10/2/2017</a:t>
+              <a:t>10/20/2017</a:t>
             </a:fld>
             <a:endParaRPr lang="en-US"/>
           </a:p>
@@ -758,7 +765,7 @@
           <a:p>
             <a:fld id="{652F1E81-1D68-4626-9ECC-923EDADFDCD3}" type="datetimeFigureOut">
               <a:rPr lang="en-US" smtClean="0"/>
-              <a:t>10/2/2017</a:t>
+              <a:t>10/20/2017</a:t>
             </a:fld>
             <a:endParaRPr lang="en-US"/>
           </a:p>
@@ -1004,7 +1011,7 @@
           <a:p>
             <a:fld id="{652F1E81-1D68-4626-9ECC-923EDADFDCD3}" type="datetimeFigureOut">
               <a:rPr lang="en-US" smtClean="0"/>
-              <a:t>10/2/2017</a:t>
+              <a:t>10/20/2017</a:t>
             </a:fld>
             <a:endParaRPr lang="en-US"/>
           </a:p>
@@ -1236,7 +1243,7 @@
           <a:p>
             <a:fld id="{652F1E81-1D68-4626-9ECC-923EDADFDCD3}" type="datetimeFigureOut">
               <a:rPr lang="en-US" smtClean="0"/>
-              <a:t>10/2/2017</a:t>
+              <a:t>10/20/2017</a:t>
             </a:fld>
             <a:endParaRPr lang="en-US"/>
           </a:p>
@@ -1603,7 +1610,7 @@
           <a:p>
             <a:fld id="{652F1E81-1D68-4626-9ECC-923EDADFDCD3}" type="datetimeFigureOut">
               <a:rPr lang="en-US" smtClean="0"/>
-              <a:t>10/2/2017</a:t>
+              <a:t>10/20/2017</a:t>
             </a:fld>
             <a:endParaRPr lang="en-US"/>
           </a:p>
@@ -1721,7 +1728,7 @@
           <a:p>
             <a:fld id="{652F1E81-1D68-4626-9ECC-923EDADFDCD3}" type="datetimeFigureOut">
               <a:rPr lang="en-US" smtClean="0"/>
-              <a:t>10/2/2017</a:t>
+              <a:t>10/20/2017</a:t>
             </a:fld>
             <a:endParaRPr lang="en-US"/>
           </a:p>
@@ -1816,7 +1823,7 @@
           <a:p>
             <a:fld id="{652F1E81-1D68-4626-9ECC-923EDADFDCD3}" type="datetimeFigureOut">
               <a:rPr lang="en-US" smtClean="0"/>
-              <a:t>10/2/2017</a:t>
+              <a:t>10/20/2017</a:t>
             </a:fld>
             <a:endParaRPr lang="en-US"/>
           </a:p>
@@ -2093,7 +2100,7 @@
           <a:p>
             <a:fld id="{652F1E81-1D68-4626-9ECC-923EDADFDCD3}" type="datetimeFigureOut">
               <a:rPr lang="en-US" smtClean="0"/>
-              <a:t>10/2/2017</a:t>
+              <a:t>10/20/2017</a:t>
             </a:fld>
             <a:endParaRPr lang="en-US"/>
           </a:p>
@@ -2346,7 +2353,7 @@
           <a:p>
             <a:fld id="{652F1E81-1D68-4626-9ECC-923EDADFDCD3}" type="datetimeFigureOut">
               <a:rPr lang="en-US" smtClean="0"/>
-              <a:t>10/2/2017</a:t>
+              <a:t>10/20/2017</a:t>
             </a:fld>
             <a:endParaRPr lang="en-US"/>
           </a:p>
@@ -2559,7 +2566,7 @@
           <a:p>
             <a:fld id="{652F1E81-1D68-4626-9ECC-923EDADFDCD3}" type="datetimeFigureOut">
               <a:rPr lang="en-US" smtClean="0"/>
-              <a:t>10/2/2017</a:t>
+              <a:t>10/20/2017</a:t>
             </a:fld>
             <a:endParaRPr lang="en-US"/>
           </a:p>
@@ -2972,8 +2979,8 @@
         </p:nvSpPr>
         <p:spPr>
           <a:xfrm>
-            <a:off x="1639614" y="1221828"/>
-            <a:ext cx="2286000" cy="859220"/>
+            <a:off x="1639614" y="1086742"/>
+            <a:ext cx="2286000" cy="994306"/>
           </a:xfrm>
           <a:prstGeom prst="rect">
             <a:avLst/>
@@ -3018,8 +3025,8 @@
         </p:nvSpPr>
         <p:spPr>
           <a:xfrm>
-            <a:off x="1388492" y="1224305"/>
-            <a:ext cx="2735317" cy="800219"/>
+            <a:off x="1431342" y="1099747"/>
+            <a:ext cx="2735317" cy="1169551"/>
           </a:xfrm>
           <a:prstGeom prst="rect">
             <a:avLst/>
@@ -3044,6 +3051,16 @@
               <a:rPr lang="en-US" sz="1400" dirty="0" smtClean="0"/>
               <a:t>Demand set using SFR2 input variable “FLOW”</a:t>
             </a:r>
+          </a:p>
+          <a:p>
+            <a:pPr algn="ctr"/>
+            <a:r>
+              <a:rPr lang="en-US" sz="1000" dirty="0"/>
+              <a:t>(IRRIGATION SEGMENT)</a:t>
+            </a:r>
+          </a:p>
+          <a:p>
+            <a:pPr algn="ctr"/>
             <a:endParaRPr lang="en-US" sz="1400" dirty="0"/>
           </a:p>
         </p:txBody>
@@ -3072,7 +3089,15 @@
           <a:p>
             <a:r>
               <a:rPr lang="en-US" dirty="0" smtClean="0"/>
-              <a:t>A) Surface water (SW) only using IRRIGATIONSEGMENT</a:t>
+              <a:t>A) Surface water (SW) </a:t>
+            </a:r>
+            <a:r>
+              <a:rPr lang="en-US" dirty="0" smtClean="0"/>
+              <a:t>irrigation </a:t>
+            </a:r>
+            <a:r>
+              <a:rPr lang="en-US" dirty="0" smtClean="0"/>
+              <a:t>using IRRIGATIONSEGMENT</a:t>
             </a:r>
             <a:endParaRPr lang="en-US" dirty="0"/>
           </a:p>
@@ -3115,16 +3140,194 @@
           </a:fontRef>
         </p:style>
       </p:cxnSp>
-      <p:sp>
-        <p:nvSpPr>
-          <p:cNvPr id="9" name="Rectangle 8"/>
+      <p:cxnSp>
+        <p:nvCxnSpPr>
+          <p:cNvPr id="13" name="Straight Connector 12"/>
+          <p:cNvCxnSpPr/>
+          <p:nvPr/>
+        </p:nvCxnSpPr>
+        <p:spPr>
+          <a:xfrm>
+            <a:off x="2811330" y="2301762"/>
+            <a:ext cx="655869" cy="655574"/>
+          </a:xfrm>
+          <a:prstGeom prst="line">
+            <a:avLst/>
+          </a:prstGeom>
+          <a:ln w="12700">
+            <a:solidFill>
+              <a:schemeClr val="tx1"/>
+            </a:solidFill>
+            <a:headEnd type="none" w="med" len="med"/>
+            <a:tailEnd type="triangle" w="med" len="med"/>
+          </a:ln>
+        </p:spPr>
+        <p:style>
+          <a:lnRef idx="1">
+            <a:schemeClr val="accent1"/>
+          </a:lnRef>
+          <a:fillRef idx="0">
+            <a:schemeClr val="accent1"/>
+          </a:fillRef>
+          <a:effectRef idx="0">
+            <a:schemeClr val="accent1"/>
+          </a:effectRef>
+          <a:fontRef idx="minor">
+            <a:schemeClr val="tx1"/>
+          </a:fontRef>
+        </p:style>
+      </p:cxnSp>
+      <p:cxnSp>
+        <p:nvCxnSpPr>
+          <p:cNvPr id="14" name="Straight Connector 13"/>
+          <p:cNvCxnSpPr/>
+          <p:nvPr/>
+        </p:nvCxnSpPr>
+        <p:spPr>
+          <a:xfrm flipV="1">
+            <a:off x="2130805" y="2304978"/>
+            <a:ext cx="680526" cy="667049"/>
+          </a:xfrm>
+          <a:prstGeom prst="line">
+            <a:avLst/>
+          </a:prstGeom>
+          <a:ln w="12700">
+            <a:solidFill>
+              <a:schemeClr val="tx1"/>
+            </a:solidFill>
+            <a:headEnd type="triangle" w="med" len="med"/>
+            <a:tailEnd type="none" w="med" len="med"/>
+          </a:ln>
+        </p:spPr>
+        <p:style>
+          <a:lnRef idx="1">
+            <a:schemeClr val="accent1"/>
+          </a:lnRef>
+          <a:fillRef idx="0">
+            <a:schemeClr val="accent1"/>
+          </a:fillRef>
+          <a:effectRef idx="0">
+            <a:schemeClr val="accent1"/>
+          </a:effectRef>
+          <a:fontRef idx="minor">
+            <a:schemeClr val="tx1"/>
+          </a:fontRef>
+        </p:style>
+      </p:cxnSp>
+      <p:sp>
+        <p:nvSpPr>
+          <p:cNvPr id="17" name="TextBox 16"/>
+          <p:cNvSpPr txBox="1"/>
+          <p:nvPr/>
+        </p:nvSpPr>
+        <p:spPr>
+          <a:xfrm>
+            <a:off x="3642172" y="3221583"/>
+            <a:ext cx="1723696" cy="738664"/>
+          </a:xfrm>
+          <a:prstGeom prst="rect">
+            <a:avLst/>
+          </a:prstGeom>
+          <a:noFill/>
+        </p:spPr>
+        <p:txBody>
+          <a:bodyPr wrap="square" rtlCol="0">
+            <a:spAutoFit/>
+          </a:bodyPr>
+          <a:lstStyle/>
+          <a:p>
+            <a:r>
+              <a:rPr lang="en-US" sz="1400" dirty="0" err="1"/>
+              <a:t>ET</a:t>
+            </a:r>
+            <a:r>
+              <a:rPr lang="en-US" sz="1400" baseline="-25000" dirty="0" err="1"/>
+              <a:t>a</a:t>
+            </a:r>
+            <a:r>
+              <a:rPr lang="en-US" sz="1400" dirty="0"/>
+              <a:t> </a:t>
+            </a:r>
+            <a:r>
+              <a:rPr lang="en-US" sz="1400" dirty="0" smtClean="0"/>
+              <a:t>calculated by UZF/PRMS</a:t>
+            </a:r>
+          </a:p>
+          <a:p>
+            <a:r>
+              <a:rPr lang="en-US" sz="1400" dirty="0"/>
+              <a:t>(</a:t>
+            </a:r>
+            <a:r>
+              <a:rPr lang="en-US" sz="1400" dirty="0" smtClean="0"/>
+              <a:t>IUZFBND&gt;0)</a:t>
+            </a:r>
+            <a:endParaRPr lang="en-US" sz="1400" dirty="0"/>
+          </a:p>
+        </p:txBody>
+      </p:sp>
+      <p:sp>
+        <p:nvSpPr>
+          <p:cNvPr id="18" name="TextBox 17"/>
+          <p:cNvSpPr txBox="1"/>
+          <p:nvPr/>
+        </p:nvSpPr>
+        <p:spPr>
+          <a:xfrm>
+            <a:off x="550207" y="3116498"/>
+            <a:ext cx="1666057" cy="954107"/>
+          </a:xfrm>
+          <a:prstGeom prst="rect">
+            <a:avLst/>
+          </a:prstGeom>
+          <a:noFill/>
+        </p:spPr>
+        <p:txBody>
+          <a:bodyPr wrap="square" rtlCol="0">
+            <a:spAutoFit/>
+          </a:bodyPr>
+          <a:lstStyle/>
+          <a:p>
+            <a:r>
+              <a:rPr lang="en-US" sz="1400" dirty="0" err="1" smtClean="0"/>
+              <a:t>ET</a:t>
+            </a:r>
+            <a:r>
+              <a:rPr lang="en-US" sz="1400" baseline="-25000" dirty="0" err="1" smtClean="0"/>
+              <a:t>a</a:t>
+            </a:r>
+            <a:r>
+              <a:rPr lang="en-US" sz="1400" dirty="0" smtClean="0"/>
+              <a:t> </a:t>
+            </a:r>
+            <a:r>
+              <a:rPr lang="en-US" sz="1400" dirty="0" smtClean="0"/>
+              <a:t>calculated in AGO using efficiency </a:t>
+            </a:r>
+            <a:r>
+              <a:rPr lang="en-US" sz="1400" dirty="0" smtClean="0"/>
+              <a:t>factor</a:t>
+            </a:r>
+          </a:p>
+          <a:p>
+            <a:r>
+              <a:rPr lang="en-US" sz="1400" dirty="0" smtClean="0"/>
+              <a:t>(IUZFBND&lt;0)</a:t>
+            </a:r>
+            <a:endParaRPr lang="en-US" sz="1400" dirty="0"/>
+          </a:p>
+        </p:txBody>
+      </p:sp>
+      <p:sp>
+        <p:nvSpPr>
+          <p:cNvPr id="19" name="Rectangle 18"/>
           <p:cNvSpPr/>
           <p:nvPr/>
         </p:nvSpPr>
         <p:spPr>
           <a:xfrm>
-            <a:off x="6550573" y="4181804"/>
-            <a:ext cx="3604677" cy="859220"/>
+            <a:off x="407109" y="2957336"/>
+            <a:ext cx="1723696" cy="1215020"/>
           </a:xfrm>
           <a:prstGeom prst="rect">
             <a:avLst/>
@@ -3161,16 +3364,131 @@
           </a:p>
         </p:txBody>
       </p:sp>
+      <p:sp>
+        <p:nvSpPr>
+          <p:cNvPr id="20" name="TextBox 19"/>
+          <p:cNvSpPr txBox="1"/>
+          <p:nvPr/>
+        </p:nvSpPr>
+        <p:spPr>
+          <a:xfrm>
+            <a:off x="1593916" y="5225425"/>
+            <a:ext cx="2488999" cy="523220"/>
+          </a:xfrm>
+          <a:prstGeom prst="rect">
+            <a:avLst/>
+          </a:prstGeom>
+          <a:noFill/>
+        </p:spPr>
+        <p:txBody>
+          <a:bodyPr wrap="square" rtlCol="0">
+            <a:spAutoFit/>
+          </a:bodyPr>
+          <a:lstStyle/>
+          <a:p>
+            <a:pPr algn="ctr"/>
+            <a:r>
+              <a:rPr lang="en-US" sz="1400" dirty="0"/>
+              <a:t>Return flows (SW+GW) calculated by UZF/PRMS</a:t>
+            </a:r>
+            <a:endParaRPr lang="en-US" sz="1400" dirty="0"/>
+          </a:p>
+        </p:txBody>
+      </p:sp>
+      <p:sp>
+        <p:nvSpPr>
+          <p:cNvPr id="21" name="Rectangle 20"/>
+          <p:cNvSpPr/>
+          <p:nvPr/>
+        </p:nvSpPr>
+        <p:spPr>
+          <a:xfrm>
+            <a:off x="3467199" y="2957336"/>
+            <a:ext cx="1723696" cy="1215020"/>
+          </a:xfrm>
+          <a:prstGeom prst="rect">
+            <a:avLst/>
+          </a:prstGeom>
+          <a:noFill/>
+          <a:ln>
+            <a:solidFill>
+              <a:schemeClr val="tx1"/>
+            </a:solidFill>
+          </a:ln>
+        </p:spPr>
+        <p:style>
+          <a:lnRef idx="2">
+            <a:schemeClr val="accent1">
+              <a:shade val="50000"/>
+            </a:schemeClr>
+          </a:lnRef>
+          <a:fillRef idx="1">
+            <a:schemeClr val="accent1"/>
+          </a:fillRef>
+          <a:effectRef idx="0">
+            <a:schemeClr val="accent1"/>
+          </a:effectRef>
+          <a:fontRef idx="minor">
+            <a:schemeClr val="lt1"/>
+          </a:fontRef>
+        </p:style>
+        <p:txBody>
+          <a:bodyPr rtlCol="0" anchor="ctr"/>
+          <a:lstStyle/>
+          <a:p>
+            <a:pPr algn="ctr"/>
+            <a:endParaRPr lang="en-US"/>
+          </a:p>
+        </p:txBody>
+      </p:sp>
+      <p:sp>
+        <p:nvSpPr>
+          <p:cNvPr id="26" name="TextBox 25"/>
+          <p:cNvSpPr txBox="1"/>
+          <p:nvPr/>
+        </p:nvSpPr>
+        <p:spPr>
+          <a:xfrm>
+            <a:off x="2458652" y="4080681"/>
+            <a:ext cx="680699" cy="523220"/>
+          </a:xfrm>
+          <a:prstGeom prst="rect">
+            <a:avLst/>
+          </a:prstGeom>
+          <a:noFill/>
+        </p:spPr>
+        <p:txBody>
+          <a:bodyPr wrap="none" rtlCol="0">
+            <a:spAutoFit/>
+          </a:bodyPr>
+          <a:lstStyle/>
+          <a:p>
+            <a:pPr algn="ctr"/>
+            <a:r>
+              <a:rPr lang="en-US" sz="1400" dirty="0" smtClean="0"/>
+              <a:t>Return</a:t>
+            </a:r>
+          </a:p>
+          <a:p>
+            <a:pPr algn="ctr"/>
+            <a:r>
+              <a:rPr lang="en-US" sz="1400" dirty="0" smtClean="0"/>
+              <a:t>flows</a:t>
+            </a:r>
+            <a:endParaRPr lang="en-US" sz="1400" dirty="0"/>
+          </a:p>
+        </p:txBody>
+      </p:sp>
       <p:cxnSp>
         <p:nvCxnSpPr>
-          <p:cNvPr id="11" name="Straight Connector 10"/>
+          <p:cNvPr id="38" name="Straight Connector 37"/>
           <p:cNvCxnSpPr/>
           <p:nvPr/>
         </p:nvCxnSpPr>
         <p:spPr>
           <a:xfrm>
-            <a:off x="7442451" y="2096813"/>
-            <a:ext cx="2845675" cy="0"/>
+            <a:off x="2130804" y="4163516"/>
+            <a:ext cx="655869" cy="655574"/>
           </a:xfrm>
           <a:prstGeom prst="line">
             <a:avLst/>
@@ -3179,6 +3497,374 @@
             <a:solidFill>
               <a:schemeClr val="tx1"/>
             </a:solidFill>
+            <a:headEnd type="none" w="med" len="med"/>
+            <a:tailEnd type="none" w="med" len="med"/>
+          </a:ln>
+        </p:spPr>
+        <p:style>
+          <a:lnRef idx="1">
+            <a:schemeClr val="accent1"/>
+          </a:lnRef>
+          <a:fillRef idx="0">
+            <a:schemeClr val="accent1"/>
+          </a:fillRef>
+          <a:effectRef idx="0">
+            <a:schemeClr val="accent1"/>
+          </a:effectRef>
+          <a:fontRef idx="minor">
+            <a:schemeClr val="tx1"/>
+          </a:fontRef>
+        </p:style>
+      </p:cxnSp>
+      <p:cxnSp>
+        <p:nvCxnSpPr>
+          <p:cNvPr id="39" name="Straight Connector 38"/>
+          <p:cNvCxnSpPr/>
+          <p:nvPr/>
+        </p:nvCxnSpPr>
+        <p:spPr>
+          <a:xfrm flipV="1">
+            <a:off x="2784025" y="4152041"/>
+            <a:ext cx="680526" cy="667049"/>
+          </a:xfrm>
+          <a:prstGeom prst="line">
+            <a:avLst/>
+          </a:prstGeom>
+          <a:ln w="12700">
+            <a:solidFill>
+              <a:schemeClr val="tx1"/>
+            </a:solidFill>
+            <a:headEnd type="none" w="med" len="med"/>
+            <a:tailEnd type="none" w="med" len="med"/>
+          </a:ln>
+        </p:spPr>
+        <p:style>
+          <a:lnRef idx="1">
+            <a:schemeClr val="accent1"/>
+          </a:lnRef>
+          <a:fillRef idx="0">
+            <a:schemeClr val="accent1"/>
+          </a:fillRef>
+          <a:effectRef idx="0">
+            <a:schemeClr val="accent1"/>
+          </a:effectRef>
+          <a:fontRef idx="minor">
+            <a:schemeClr val="tx1"/>
+          </a:fontRef>
+        </p:style>
+      </p:cxnSp>
+      <p:cxnSp>
+        <p:nvCxnSpPr>
+          <p:cNvPr id="43" name="Straight Arrow Connector 42"/>
+          <p:cNvCxnSpPr/>
+          <p:nvPr/>
+        </p:nvCxnSpPr>
+        <p:spPr>
+          <a:xfrm flipH="1">
+            <a:off x="2783834" y="4824598"/>
+            <a:ext cx="3" cy="225385"/>
+          </a:xfrm>
+          <a:prstGeom prst="straightConnector1">
+            <a:avLst/>
+          </a:prstGeom>
+          <a:ln w="12700">
+            <a:solidFill>
+              <a:schemeClr val="tx1"/>
+            </a:solidFill>
+            <a:headEnd type="none" w="med" len="med"/>
+            <a:tailEnd type="triangle" w="med" len="med"/>
+          </a:ln>
+        </p:spPr>
+        <p:style>
+          <a:lnRef idx="1">
+            <a:schemeClr val="accent1"/>
+          </a:lnRef>
+          <a:fillRef idx="0">
+            <a:schemeClr val="accent1"/>
+          </a:fillRef>
+          <a:effectRef idx="0">
+            <a:schemeClr val="accent1"/>
+          </a:effectRef>
+          <a:fontRef idx="minor">
+            <a:schemeClr val="tx1"/>
+          </a:fontRef>
+        </p:style>
+      </p:cxnSp>
+      <p:sp>
+        <p:nvSpPr>
+          <p:cNvPr id="44" name="Rectangle 43"/>
+          <p:cNvSpPr/>
+          <p:nvPr/>
+        </p:nvSpPr>
+        <p:spPr>
+          <a:xfrm>
+            <a:off x="1383236" y="5055490"/>
+            <a:ext cx="2801196" cy="955089"/>
+          </a:xfrm>
+          <a:prstGeom prst="rect">
+            <a:avLst/>
+          </a:prstGeom>
+          <a:noFill/>
+          <a:ln>
+            <a:solidFill>
+              <a:schemeClr val="tx1"/>
+            </a:solidFill>
+          </a:ln>
+        </p:spPr>
+        <p:style>
+          <a:lnRef idx="2">
+            <a:schemeClr val="accent1">
+              <a:shade val="50000"/>
+            </a:schemeClr>
+          </a:lnRef>
+          <a:fillRef idx="1">
+            <a:schemeClr val="accent1"/>
+          </a:fillRef>
+          <a:effectRef idx="0">
+            <a:schemeClr val="accent1"/>
+          </a:effectRef>
+          <a:fontRef idx="minor">
+            <a:schemeClr val="lt1"/>
+          </a:fontRef>
+        </p:style>
+        <p:txBody>
+          <a:bodyPr rtlCol="0" anchor="ctr"/>
+          <a:lstStyle/>
+          <a:p>
+            <a:pPr algn="ctr"/>
+            <a:endParaRPr lang="en-US"/>
+          </a:p>
+        </p:txBody>
+      </p:sp>
+      <p:sp>
+        <p:nvSpPr>
+          <p:cNvPr id="45" name="TextBox 44"/>
+          <p:cNvSpPr txBox="1"/>
+          <p:nvPr/>
+        </p:nvSpPr>
+        <p:spPr>
+          <a:xfrm>
+            <a:off x="2384606" y="2638219"/>
+            <a:ext cx="907620" cy="523220"/>
+          </a:xfrm>
+          <a:prstGeom prst="rect">
+            <a:avLst/>
+          </a:prstGeom>
+          <a:noFill/>
+        </p:spPr>
+        <p:txBody>
+          <a:bodyPr wrap="none" rtlCol="0">
+            <a:spAutoFit/>
+          </a:bodyPr>
+          <a:lstStyle/>
+          <a:p>
+            <a:pPr algn="ctr"/>
+            <a:r>
+              <a:rPr lang="en-US" sz="1400" dirty="0" smtClean="0"/>
+              <a:t>Diversion </a:t>
+            </a:r>
+          </a:p>
+          <a:p>
+            <a:pPr algn="ctr"/>
+            <a:r>
+              <a:rPr lang="en-US" sz="1400" dirty="0" smtClean="0"/>
+              <a:t>flows</a:t>
+            </a:r>
+            <a:endParaRPr lang="en-US" sz="1400" dirty="0"/>
+          </a:p>
+        </p:txBody>
+      </p:sp>
+    </p:spTree>
+    <p:extLst>
+      <p:ext uri="{BB962C8B-B14F-4D97-AF65-F5344CB8AC3E}">
+        <p14:creationId xmlns:p14="http://schemas.microsoft.com/office/powerpoint/2010/main" val="3448900807"/>
+      </p:ext>
+    </p:extLst>
+  </p:cSld>
+  <p:clrMapOvr>
+    <a:masterClrMapping/>
+  </p:clrMapOvr>
+</p:sld>
+</file>
+
+<file path=ppt/slides/slide2.xml><?xml version="1.0" encoding="utf-8"?>
+<p:sld xmlns:a="http://schemas.openxmlformats.org/drawingml/2006/main" xmlns:r="http://schemas.openxmlformats.org/officeDocument/2006/relationships" xmlns:p="http://schemas.openxmlformats.org/presentationml/2006/main">
+  <p:cSld>
+    <p:spTree>
+      <p:nvGrpSpPr>
+        <p:cNvPr id="1" name=""/>
+        <p:cNvGrpSpPr/>
+        <p:nvPr/>
+      </p:nvGrpSpPr>
+      <p:grpSpPr>
+        <a:xfrm>
+          <a:off x="0" y="0"/>
+          <a:ext cx="0" cy="0"/>
+          <a:chOff x="0" y="0"/>
+          <a:chExt cx="0" cy="0"/>
+        </a:xfrm>
+      </p:grpSpPr>
+      <p:sp>
+        <p:nvSpPr>
+          <p:cNvPr id="4" name="Rectangle 3"/>
+          <p:cNvSpPr/>
+          <p:nvPr/>
+        </p:nvSpPr>
+        <p:spPr>
+          <a:xfrm>
+            <a:off x="450916" y="109673"/>
+            <a:ext cx="2286000" cy="1160236"/>
+          </a:xfrm>
+          <a:prstGeom prst="rect">
+            <a:avLst/>
+          </a:prstGeom>
+          <a:noFill/>
+          <a:ln>
+            <a:solidFill>
+              <a:schemeClr val="tx1"/>
+            </a:solidFill>
+          </a:ln>
+        </p:spPr>
+        <p:style>
+          <a:lnRef idx="2">
+            <a:schemeClr val="accent1">
+              <a:shade val="50000"/>
+            </a:schemeClr>
+          </a:lnRef>
+          <a:fillRef idx="1">
+            <a:schemeClr val="accent1"/>
+          </a:fillRef>
+          <a:effectRef idx="0">
+            <a:schemeClr val="accent1"/>
+          </a:effectRef>
+          <a:fontRef idx="minor">
+            <a:schemeClr val="lt1"/>
+          </a:fontRef>
+        </p:style>
+        <p:txBody>
+          <a:bodyPr rtlCol="0" anchor="ctr"/>
+          <a:lstStyle/>
+          <a:p>
+            <a:pPr algn="ctr"/>
+            <a:endParaRPr lang="en-US"/>
+          </a:p>
+        </p:txBody>
+      </p:sp>
+      <p:sp>
+        <p:nvSpPr>
+          <p:cNvPr id="5" name="TextBox 4"/>
+          <p:cNvSpPr txBox="1"/>
+          <p:nvPr/>
+        </p:nvSpPr>
+        <p:spPr>
+          <a:xfrm>
+            <a:off x="207676" y="144455"/>
+            <a:ext cx="2735317" cy="892552"/>
+          </a:xfrm>
+          <a:prstGeom prst="rect">
+            <a:avLst/>
+          </a:prstGeom>
+          <a:noFill/>
+        </p:spPr>
+        <p:txBody>
+          <a:bodyPr wrap="square" rtlCol="0">
+            <a:spAutoFit/>
+          </a:bodyPr>
+          <a:lstStyle/>
+          <a:p>
+            <a:pPr algn="ctr"/>
+            <a:r>
+              <a:rPr lang="en-US" sz="1400" dirty="0"/>
+              <a:t>SW diversion</a:t>
+            </a:r>
+          </a:p>
+          <a:p>
+            <a:pPr algn="ctr"/>
+            <a:r>
+              <a:rPr lang="en-US" sz="1400" dirty="0"/>
+              <a:t>Demand set using SFR2 input variable “FLOW”</a:t>
+            </a:r>
+          </a:p>
+          <a:p>
+            <a:pPr algn="ctr"/>
+            <a:r>
+              <a:rPr lang="en-US" sz="1000" dirty="0"/>
+              <a:t>(</a:t>
+            </a:r>
+            <a:r>
+              <a:rPr lang="en-US" sz="1000" dirty="0" smtClean="0"/>
+              <a:t>IRRIGATIONSEGMENT</a:t>
+            </a:r>
+            <a:r>
+              <a:rPr lang="en-US" sz="1000" dirty="0"/>
+              <a:t>)</a:t>
+            </a:r>
+            <a:endParaRPr lang="en-US" sz="1000" dirty="0"/>
+          </a:p>
+        </p:txBody>
+      </p:sp>
+      <p:sp>
+        <p:nvSpPr>
+          <p:cNvPr id="6" name="TextBox 5"/>
+          <p:cNvSpPr txBox="1"/>
+          <p:nvPr/>
+        </p:nvSpPr>
+        <p:spPr>
+          <a:xfrm>
+            <a:off x="6293157" y="276302"/>
+            <a:ext cx="4572001" cy="923330"/>
+          </a:xfrm>
+          <a:prstGeom prst="rect">
+            <a:avLst/>
+          </a:prstGeom>
+          <a:noFill/>
+        </p:spPr>
+        <p:txBody>
+          <a:bodyPr wrap="square" rtlCol="0">
+            <a:spAutoFit/>
+          </a:bodyPr>
+          <a:lstStyle/>
+          <a:p>
+            <a:r>
+              <a:rPr lang="en-US" dirty="0" smtClean="0"/>
+              <a:t>B) Surface water (SW) and groundwater (GW) </a:t>
+            </a:r>
+            <a:r>
+              <a:rPr lang="en-US" dirty="0" smtClean="0"/>
+              <a:t>irrigation </a:t>
+            </a:r>
+            <a:r>
+              <a:rPr lang="en-US" dirty="0" smtClean="0"/>
+              <a:t>using </a:t>
+            </a:r>
+            <a:r>
+              <a:rPr lang="en-US" dirty="0" smtClean="0"/>
+              <a:t>IRRIGATIONSEGMENT and IRRIGATIONWELL</a:t>
+            </a:r>
+            <a:endParaRPr lang="en-US" dirty="0"/>
+          </a:p>
+        </p:txBody>
+      </p:sp>
+      <p:cxnSp>
+        <p:nvCxnSpPr>
+          <p:cNvPr id="8" name="Straight Arrow Connector 7"/>
+          <p:cNvCxnSpPr/>
+          <p:nvPr/>
+        </p:nvCxnSpPr>
+        <p:spPr>
+          <a:xfrm>
+            <a:off x="1608939" y="1269908"/>
+            <a:ext cx="0" cy="237744"/>
+          </a:xfrm>
+          <a:prstGeom prst="straightConnector1">
+            <a:avLst/>
+          </a:prstGeom>
+          <a:ln w="19050">
+            <a:solidFill>
+              <a:schemeClr val="tx1"/>
+            </a:solidFill>
+            <a:headEnd type="none" w="med" len="med"/>
+            <a:tailEnd type="triangle" w="med" len="med"/>
           </a:ln>
         </p:spPr>
         <p:style>
@@ -3204,7 +3890,7 @@
         </p:nvCxnSpPr>
         <p:spPr>
           <a:xfrm>
-            <a:off x="2811330" y="2301762"/>
+            <a:off x="2811330" y="2583460"/>
             <a:ext cx="655869" cy="655574"/>
           </a:xfrm>
           <a:prstGeom prst="line">
@@ -3241,7 +3927,7 @@
         </p:nvCxnSpPr>
         <p:spPr>
           <a:xfrm flipV="1">
-            <a:off x="2130805" y="2304978"/>
+            <a:off x="2130805" y="2586676"/>
             <a:ext cx="680526" cy="667049"/>
           </a:xfrm>
           <a:prstGeom prst="line">
@@ -3278,7 +3964,7 @@
         </p:nvSpPr>
         <p:spPr>
           <a:xfrm>
-            <a:off x="3467199" y="3135975"/>
+            <a:off x="3673179" y="3233148"/>
             <a:ext cx="1723696" cy="738664"/>
           </a:xfrm>
           <a:prstGeom prst="rect">
@@ -3293,24 +3979,22 @@
           <a:lstStyle/>
           <a:p>
             <a:r>
-              <a:rPr lang="en-US" sz="1400" dirty="0" smtClean="0"/>
-              <a:t>Kc*</a:t>
-            </a:r>
-            <a:r>
-              <a:rPr lang="en-US" sz="1400" dirty="0" err="1" smtClean="0"/>
-              <a:t>ETo</a:t>
-            </a:r>
-            <a:r>
-              <a:rPr lang="en-US" sz="1400" dirty="0" smtClean="0"/>
-              <a:t> specified in UZF; </a:t>
-            </a:r>
-            <a:r>
-              <a:rPr lang="en-US" sz="1400" dirty="0" err="1" smtClean="0"/>
-              <a:t>ETa</a:t>
-            </a:r>
-            <a:r>
-              <a:rPr lang="en-US" sz="1400" dirty="0" smtClean="0"/>
-              <a:t> (SW+GW) calculated by UZF</a:t>
+              <a:rPr lang="en-US" sz="1400" dirty="0" err="1"/>
+              <a:t>ET</a:t>
+            </a:r>
+            <a:r>
+              <a:rPr lang="en-US" sz="1400" baseline="-25000" dirty="0" err="1"/>
+              <a:t>a</a:t>
+            </a:r>
+            <a:r>
+              <a:rPr lang="en-US" sz="1400" dirty="0"/>
+              <a:t> calculated by UZF/PRMS</a:t>
+            </a:r>
+          </a:p>
+          <a:p>
+            <a:r>
+              <a:rPr lang="en-US" sz="1400" dirty="0"/>
+              <a:t>(IUZFBND&gt;0)</a:t>
             </a:r>
             <a:endParaRPr lang="en-US" sz="1400" dirty="0"/>
           </a:p>
@@ -3324,8 +4008,8 @@
         </p:nvSpPr>
         <p:spPr>
           <a:xfrm>
-            <a:off x="550207" y="3116498"/>
-            <a:ext cx="1666057" cy="738664"/>
+            <a:off x="577209" y="3229173"/>
+            <a:ext cx="1666057" cy="954107"/>
           </a:xfrm>
           <a:prstGeom prst="rect">
             <a:avLst/>
@@ -3339,12 +4023,22 @@
           <a:lstStyle/>
           <a:p>
             <a:r>
-              <a:rPr lang="en-US" sz="1400" dirty="0" err="1" smtClean="0"/>
-              <a:t>ETa</a:t>
-            </a:r>
-            <a:r>
-              <a:rPr lang="en-US" sz="1400" dirty="0" smtClean="0"/>
+              <a:rPr lang="en-US" sz="1400" dirty="0" err="1"/>
+              <a:t>ET</a:t>
+            </a:r>
+            <a:r>
+              <a:rPr lang="en-US" sz="1400" baseline="-25000" dirty="0" err="1"/>
+              <a:t>a</a:t>
+            </a:r>
+            <a:r>
+              <a:rPr lang="en-US" sz="1400" dirty="0"/>
               <a:t> calculated in AGO using efficiency factor</a:t>
+            </a:r>
+          </a:p>
+          <a:p>
+            <a:r>
+              <a:rPr lang="en-US" sz="1400" dirty="0"/>
+              <a:t>(IUZFBND&lt;0)</a:t>
             </a:r>
             <a:endParaRPr lang="en-US" sz="1400" dirty="0"/>
           </a:p>
@@ -3358,8 +4052,8 @@
         </p:nvSpPr>
         <p:spPr>
           <a:xfrm>
-            <a:off x="407109" y="2957336"/>
-            <a:ext cx="1723696" cy="1215020"/>
+            <a:off x="407109" y="3239034"/>
+            <a:ext cx="1723696" cy="955721"/>
           </a:xfrm>
           <a:prstGeom prst="rect">
             <a:avLst/>
@@ -3398,45 +4092,14 @@
       </p:sp>
       <p:sp>
         <p:nvSpPr>
-          <p:cNvPr id="20" name="TextBox 19"/>
-          <p:cNvSpPr txBox="1"/>
-          <p:nvPr/>
-        </p:nvSpPr>
-        <p:spPr>
-          <a:xfrm>
-            <a:off x="1593916" y="5069471"/>
-            <a:ext cx="2488999" cy="954107"/>
-          </a:xfrm>
-          <a:prstGeom prst="rect">
-            <a:avLst/>
-          </a:prstGeom>
-          <a:noFill/>
-        </p:spPr>
-        <p:txBody>
-          <a:bodyPr wrap="square" rtlCol="0">
-            <a:spAutoFit/>
-          </a:bodyPr>
-          <a:lstStyle/>
-          <a:p>
-            <a:pPr algn="ctr"/>
-            <a:r>
-              <a:rPr lang="en-US" sz="1400" dirty="0" smtClean="0"/>
-              <a:t>UZF routes SW return flows using IRUNBND and groundwater return flows as recharge to MODFLOW</a:t>
-            </a:r>
-            <a:endParaRPr lang="en-US" sz="1400" dirty="0"/>
-          </a:p>
-        </p:txBody>
-      </p:sp>
-      <p:sp>
-        <p:nvSpPr>
           <p:cNvPr id="21" name="Rectangle 20"/>
           <p:cNvSpPr/>
           <p:nvPr/>
         </p:nvSpPr>
         <p:spPr>
           <a:xfrm>
-            <a:off x="3467199" y="2957336"/>
-            <a:ext cx="1723696" cy="1215020"/>
+            <a:off x="3467199" y="3239034"/>
+            <a:ext cx="1723696" cy="963670"/>
           </a:xfrm>
           <a:prstGeom prst="rect">
             <a:avLst/>
@@ -3473,219 +4136,6 @@
           </a:p>
         </p:txBody>
       </p:sp>
-      <p:sp>
-        <p:nvSpPr>
-          <p:cNvPr id="22" name="TextBox 21"/>
-          <p:cNvSpPr txBox="1"/>
-          <p:nvPr/>
-        </p:nvSpPr>
-        <p:spPr>
-          <a:xfrm>
-            <a:off x="9661096" y="5258646"/>
-            <a:ext cx="1699482" cy="1200329"/>
-          </a:xfrm>
-          <a:prstGeom prst="rect">
-            <a:avLst/>
-          </a:prstGeom>
-          <a:noFill/>
-        </p:spPr>
-        <p:txBody>
-          <a:bodyPr wrap="square" rtlCol="0">
-            <a:spAutoFit/>
-          </a:bodyPr>
-          <a:lstStyle/>
-          <a:p>
-            <a:r>
-              <a:rPr lang="en-US" dirty="0" smtClean="0"/>
-              <a:t>Surface water delivery is applied to UZF cells</a:t>
-            </a:r>
-            <a:endParaRPr lang="en-US" dirty="0"/>
-          </a:p>
-        </p:txBody>
-      </p:sp>
-      <p:cxnSp>
-        <p:nvCxnSpPr>
-          <p:cNvPr id="24" name="Straight Arrow Connector 23"/>
-          <p:cNvCxnSpPr/>
-          <p:nvPr/>
-        </p:nvCxnSpPr>
-        <p:spPr>
-          <a:xfrm>
-            <a:off x="9661096" y="3638545"/>
-            <a:ext cx="1336394" cy="0"/>
-          </a:xfrm>
-          <a:prstGeom prst="straightConnector1">
-            <a:avLst/>
-          </a:prstGeom>
-          <a:ln w="19050">
-            <a:solidFill>
-              <a:schemeClr val="tx1"/>
-            </a:solidFill>
-            <a:tailEnd type="triangle"/>
-          </a:ln>
-        </p:spPr>
-        <p:style>
-          <a:lnRef idx="1">
-            <a:schemeClr val="accent1"/>
-          </a:lnRef>
-          <a:fillRef idx="0">
-            <a:schemeClr val="accent1"/>
-          </a:fillRef>
-          <a:effectRef idx="0">
-            <a:schemeClr val="accent1"/>
-          </a:effectRef>
-          <a:fontRef idx="minor">
-            <a:schemeClr val="tx1"/>
-          </a:fontRef>
-        </p:style>
-      </p:cxnSp>
-      <p:sp>
-        <p:nvSpPr>
-          <p:cNvPr id="26" name="TextBox 25"/>
-          <p:cNvSpPr txBox="1"/>
-          <p:nvPr/>
-        </p:nvSpPr>
-        <p:spPr>
-          <a:xfrm>
-            <a:off x="2458652" y="4080681"/>
-            <a:ext cx="680699" cy="523220"/>
-          </a:xfrm>
-          <a:prstGeom prst="rect">
-            <a:avLst/>
-          </a:prstGeom>
-          <a:noFill/>
-        </p:spPr>
-        <p:txBody>
-          <a:bodyPr wrap="none" rtlCol="0">
-            <a:spAutoFit/>
-          </a:bodyPr>
-          <a:lstStyle/>
-          <a:p>
-            <a:pPr algn="ctr"/>
-            <a:r>
-              <a:rPr lang="en-US" sz="1400" dirty="0" smtClean="0"/>
-              <a:t>Return</a:t>
-            </a:r>
-          </a:p>
-          <a:p>
-            <a:pPr algn="ctr"/>
-            <a:r>
-              <a:rPr lang="en-US" sz="1400" dirty="0" smtClean="0"/>
-              <a:t>flows</a:t>
-            </a:r>
-            <a:endParaRPr lang="en-US" sz="1400" dirty="0"/>
-          </a:p>
-        </p:txBody>
-      </p:sp>
-      <p:cxnSp>
-        <p:nvCxnSpPr>
-          <p:cNvPr id="30" name="Straight Arrow Connector 29"/>
-          <p:cNvCxnSpPr/>
-          <p:nvPr/>
-        </p:nvCxnSpPr>
-        <p:spPr>
-          <a:xfrm>
-            <a:off x="10468137" y="377050"/>
-            <a:ext cx="167" cy="387973"/>
-          </a:xfrm>
-          <a:prstGeom prst="straightConnector1">
-            <a:avLst/>
-          </a:prstGeom>
-          <a:ln>
-            <a:tailEnd type="triangle"/>
-          </a:ln>
-        </p:spPr>
-        <p:style>
-          <a:lnRef idx="1">
-            <a:schemeClr val="accent1"/>
-          </a:lnRef>
-          <a:fillRef idx="0">
-            <a:schemeClr val="accent1"/>
-          </a:fillRef>
-          <a:effectRef idx="0">
-            <a:schemeClr val="accent1"/>
-          </a:effectRef>
-          <a:fontRef idx="minor">
-            <a:schemeClr val="tx1"/>
-          </a:fontRef>
-        </p:style>
-      </p:cxnSp>
-      <p:sp>
-        <p:nvSpPr>
-          <p:cNvPr id="31" name="Rectangle 30"/>
-          <p:cNvSpPr/>
-          <p:nvPr/>
-        </p:nvSpPr>
-        <p:spPr>
-          <a:xfrm>
-            <a:off x="9593149" y="789615"/>
-            <a:ext cx="1723696" cy="966563"/>
-          </a:xfrm>
-          <a:prstGeom prst="rect">
-            <a:avLst/>
-          </a:prstGeom>
-          <a:noFill/>
-          <a:ln>
-            <a:solidFill>
-              <a:schemeClr val="tx1"/>
-            </a:solidFill>
-          </a:ln>
-        </p:spPr>
-        <p:style>
-          <a:lnRef idx="2">
-            <a:schemeClr val="accent1">
-              <a:shade val="50000"/>
-            </a:schemeClr>
-          </a:lnRef>
-          <a:fillRef idx="1">
-            <a:schemeClr val="accent1"/>
-          </a:fillRef>
-          <a:effectRef idx="0">
-            <a:schemeClr val="accent1"/>
-          </a:effectRef>
-          <a:fontRef idx="minor">
-            <a:schemeClr val="lt1"/>
-          </a:fontRef>
-        </p:style>
-        <p:txBody>
-          <a:bodyPr rtlCol="0" anchor="ctr"/>
-          <a:lstStyle/>
-          <a:p>
-            <a:pPr algn="ctr"/>
-            <a:endParaRPr lang="en-US"/>
-          </a:p>
-        </p:txBody>
-      </p:sp>
-      <p:sp>
-        <p:nvSpPr>
-          <p:cNvPr id="32" name="TextBox 31"/>
-          <p:cNvSpPr txBox="1"/>
-          <p:nvPr/>
-        </p:nvSpPr>
-        <p:spPr>
-          <a:xfrm>
-            <a:off x="9727391" y="832848"/>
-            <a:ext cx="1699482" cy="923330"/>
-          </a:xfrm>
-          <a:prstGeom prst="rect">
-            <a:avLst/>
-          </a:prstGeom>
-          <a:noFill/>
-        </p:spPr>
-        <p:txBody>
-          <a:bodyPr wrap="square" rtlCol="0">
-            <a:spAutoFit/>
-          </a:bodyPr>
-          <a:lstStyle/>
-          <a:p>
-            <a:r>
-              <a:rPr lang="en-US" dirty="0" smtClean="0"/>
-              <a:t>UZF calculates GW and SW return flows</a:t>
-            </a:r>
-            <a:endParaRPr lang="en-US" dirty="0"/>
-          </a:p>
-        </p:txBody>
-      </p:sp>
       <p:cxnSp>
         <p:nvCxnSpPr>
           <p:cNvPr id="38" name="Straight Connector 37"/>
@@ -3694,8 +4144,8 @@
         </p:nvCxnSpPr>
         <p:spPr>
           <a:xfrm>
-            <a:off x="2130804" y="4163516"/>
-            <a:ext cx="655869" cy="655574"/>
+            <a:off x="2122588" y="4185942"/>
+            <a:ext cx="656457" cy="675862"/>
           </a:xfrm>
           <a:prstGeom prst="line">
             <a:avLst/>
@@ -3725,13 +4175,649 @@
       </p:cxnSp>
       <p:cxnSp>
         <p:nvCxnSpPr>
-          <p:cNvPr id="39" name="Straight Connector 38"/>
+          <p:cNvPr id="43" name="Straight Arrow Connector 42"/>
           <p:cNvCxnSpPr/>
           <p:nvPr/>
         </p:nvCxnSpPr>
         <p:spPr>
+          <a:xfrm flipH="1">
+            <a:off x="2779045" y="4876078"/>
+            <a:ext cx="3" cy="225385"/>
+          </a:xfrm>
+          <a:prstGeom prst="straightConnector1">
+            <a:avLst/>
+          </a:prstGeom>
+          <a:ln w="12700">
+            <a:solidFill>
+              <a:schemeClr val="tx1"/>
+            </a:solidFill>
+            <a:headEnd type="none" w="med" len="med"/>
+            <a:tailEnd type="triangle" w="med" len="med"/>
+          </a:ln>
+        </p:spPr>
+        <p:style>
+          <a:lnRef idx="1">
+            <a:schemeClr val="accent1"/>
+          </a:lnRef>
+          <a:fillRef idx="0">
+            <a:schemeClr val="accent1"/>
+          </a:fillRef>
+          <a:effectRef idx="0">
+            <a:schemeClr val="accent1"/>
+          </a:effectRef>
+          <a:fontRef idx="minor">
+            <a:schemeClr val="tx1"/>
+          </a:fontRef>
+        </p:style>
+      </p:cxnSp>
+      <p:grpSp>
+        <p:nvGrpSpPr>
+          <p:cNvPr id="10" name="Group 9"/>
+          <p:cNvGrpSpPr/>
+          <p:nvPr/>
+        </p:nvGrpSpPr>
+        <p:grpSpPr>
+          <a:xfrm>
+            <a:off x="1740132" y="5107216"/>
+            <a:ext cx="2081315" cy="787562"/>
+            <a:chOff x="1383236" y="5725378"/>
+            <a:chExt cx="2801196" cy="955089"/>
+          </a:xfrm>
+        </p:grpSpPr>
+        <p:sp>
+          <p:nvSpPr>
+            <p:cNvPr id="20" name="TextBox 19"/>
+            <p:cNvSpPr txBox="1"/>
+            <p:nvPr/>
+          </p:nvSpPr>
+          <p:spPr>
+            <a:xfrm>
+              <a:off x="1593916" y="5740069"/>
+              <a:ext cx="2488999" cy="523220"/>
+            </a:xfrm>
+            <a:prstGeom prst="rect">
+              <a:avLst/>
+            </a:prstGeom>
+            <a:noFill/>
+          </p:spPr>
+          <p:txBody>
+            <a:bodyPr wrap="square" rtlCol="0">
+              <a:spAutoFit/>
+            </a:bodyPr>
+            <a:lstStyle/>
+            <a:p>
+              <a:pPr algn="ctr"/>
+              <a:r>
+                <a:rPr lang="en-US" sz="1400" dirty="0"/>
+                <a:t>Return flows </a:t>
+              </a:r>
+              <a:r>
+                <a:rPr lang="en-US" sz="1400" dirty="0" smtClean="0"/>
+                <a:t>(SW+GW) calculated </a:t>
+              </a:r>
+              <a:r>
+                <a:rPr lang="en-US" sz="1400" dirty="0"/>
+                <a:t>by </a:t>
+              </a:r>
+              <a:r>
+                <a:rPr lang="en-US" sz="1400" dirty="0" smtClean="0"/>
+                <a:t>UZF/PRMS</a:t>
+              </a:r>
+              <a:endParaRPr lang="en-US" sz="1400" dirty="0"/>
+            </a:p>
+          </p:txBody>
+        </p:sp>
+        <p:sp>
+          <p:nvSpPr>
+            <p:cNvPr id="44" name="Rectangle 43"/>
+            <p:cNvSpPr/>
+            <p:nvPr/>
+          </p:nvSpPr>
+          <p:spPr>
+            <a:xfrm>
+              <a:off x="1383236" y="5725378"/>
+              <a:ext cx="2801196" cy="955089"/>
+            </a:xfrm>
+            <a:prstGeom prst="rect">
+              <a:avLst/>
+            </a:prstGeom>
+            <a:noFill/>
+            <a:ln>
+              <a:solidFill>
+                <a:schemeClr val="tx1"/>
+              </a:solidFill>
+            </a:ln>
+          </p:spPr>
+          <p:style>
+            <a:lnRef idx="2">
+              <a:schemeClr val="accent1">
+                <a:shade val="50000"/>
+              </a:schemeClr>
+            </a:lnRef>
+            <a:fillRef idx="1">
+              <a:schemeClr val="accent1"/>
+            </a:fillRef>
+            <a:effectRef idx="0">
+              <a:schemeClr val="accent1"/>
+            </a:effectRef>
+            <a:fontRef idx="minor">
+              <a:schemeClr val="lt1"/>
+            </a:fontRef>
+          </p:style>
+          <p:txBody>
+            <a:bodyPr rtlCol="0" anchor="ctr"/>
+            <a:lstStyle/>
+            <a:p>
+              <a:pPr algn="ctr"/>
+              <a:endParaRPr lang="en-US"/>
+            </a:p>
+          </p:txBody>
+        </p:sp>
+      </p:grpSp>
+      <p:sp>
+        <p:nvSpPr>
+          <p:cNvPr id="45" name="TextBox 44"/>
+          <p:cNvSpPr txBox="1"/>
+          <p:nvPr/>
+        </p:nvSpPr>
+        <p:spPr>
+          <a:xfrm>
+            <a:off x="2405282" y="2851389"/>
+            <a:ext cx="854529" cy="523220"/>
+          </a:xfrm>
+          <a:prstGeom prst="rect">
+            <a:avLst/>
+          </a:prstGeom>
+          <a:noFill/>
+        </p:spPr>
+        <p:txBody>
+          <a:bodyPr wrap="none" rtlCol="0">
+            <a:spAutoFit/>
+          </a:bodyPr>
+          <a:lstStyle/>
+          <a:p>
+            <a:pPr algn="ctr"/>
+            <a:r>
+              <a:rPr lang="en-US" sz="1400" dirty="0" smtClean="0"/>
+              <a:t>SW/GW </a:t>
+            </a:r>
+          </a:p>
+          <a:p>
+            <a:pPr algn="ctr"/>
+            <a:r>
+              <a:rPr lang="en-US" sz="1400" dirty="0" smtClean="0"/>
+              <a:t>Irrigation</a:t>
+            </a:r>
+            <a:endParaRPr lang="en-US" sz="1400" dirty="0"/>
+          </a:p>
+        </p:txBody>
+      </p:sp>
+      <p:grpSp>
+        <p:nvGrpSpPr>
+          <p:cNvPr id="29" name="Group 28"/>
+          <p:cNvGrpSpPr/>
+          <p:nvPr/>
+        </p:nvGrpSpPr>
+        <p:grpSpPr>
+          <a:xfrm>
+            <a:off x="2721930" y="424325"/>
+            <a:ext cx="2735317" cy="590705"/>
+            <a:chOff x="3017617" y="694857"/>
+            <a:chExt cx="2735317" cy="590705"/>
+          </a:xfrm>
+        </p:grpSpPr>
+        <p:sp>
+          <p:nvSpPr>
+            <p:cNvPr id="22" name="Rectangle 21"/>
+            <p:cNvSpPr/>
+            <p:nvPr/>
+          </p:nvSpPr>
+          <p:spPr>
+            <a:xfrm>
+              <a:off x="3242276" y="694857"/>
+              <a:ext cx="2286000" cy="590705"/>
+            </a:xfrm>
+            <a:prstGeom prst="rect">
+              <a:avLst/>
+            </a:prstGeom>
+            <a:noFill/>
+            <a:ln>
+              <a:solidFill>
+                <a:schemeClr val="tx1"/>
+              </a:solidFill>
+            </a:ln>
+          </p:spPr>
+          <p:style>
+            <a:lnRef idx="2">
+              <a:schemeClr val="accent1">
+                <a:shade val="50000"/>
+              </a:schemeClr>
+            </a:lnRef>
+            <a:fillRef idx="1">
+              <a:schemeClr val="accent1"/>
+            </a:fillRef>
+            <a:effectRef idx="0">
+              <a:schemeClr val="accent1"/>
+            </a:effectRef>
+            <a:fontRef idx="minor">
+              <a:schemeClr val="lt1"/>
+            </a:fontRef>
+          </p:style>
+          <p:txBody>
+            <a:bodyPr rtlCol="0" anchor="ctr"/>
+            <a:lstStyle/>
+            <a:p>
+              <a:pPr algn="ctr"/>
+              <a:endParaRPr lang="en-US"/>
+            </a:p>
+          </p:txBody>
+        </p:sp>
+        <p:sp>
+          <p:nvSpPr>
+            <p:cNvPr id="23" name="TextBox 22"/>
+            <p:cNvSpPr txBox="1"/>
+            <p:nvPr/>
+          </p:nvSpPr>
+          <p:spPr>
+            <a:xfrm>
+              <a:off x="3017617" y="762342"/>
+              <a:ext cx="2735317" cy="523220"/>
+            </a:xfrm>
+            <a:prstGeom prst="rect">
+              <a:avLst/>
+            </a:prstGeom>
+            <a:noFill/>
+          </p:spPr>
+          <p:txBody>
+            <a:bodyPr wrap="square" rtlCol="0">
+              <a:spAutoFit/>
+            </a:bodyPr>
+            <a:lstStyle/>
+            <a:p>
+              <a:pPr algn="ctr"/>
+              <a:r>
+                <a:rPr lang="en-US" sz="1400" dirty="0" smtClean="0"/>
+                <a:t>Demand </a:t>
+              </a:r>
+              <a:r>
+                <a:rPr lang="en-US" sz="1400" dirty="0" smtClean="0"/>
+                <a:t>set using AGO input variable “Q</a:t>
+              </a:r>
+              <a:r>
+                <a:rPr lang="en-US" sz="1400" dirty="0" smtClean="0"/>
+                <a:t>”</a:t>
+              </a:r>
+            </a:p>
+          </p:txBody>
+        </p:sp>
+      </p:grpSp>
+      <p:grpSp>
+        <p:nvGrpSpPr>
+          <p:cNvPr id="12" name="Group 11"/>
+          <p:cNvGrpSpPr/>
+          <p:nvPr/>
+        </p:nvGrpSpPr>
+        <p:grpSpPr>
+          <a:xfrm>
+            <a:off x="450916" y="1491685"/>
+            <a:ext cx="2332918" cy="828057"/>
+            <a:chOff x="7067376" y="1890798"/>
+            <a:chExt cx="2332918" cy="828057"/>
+          </a:xfrm>
+        </p:grpSpPr>
+        <p:sp>
+          <p:nvSpPr>
+            <p:cNvPr id="25" name="Rectangle 24"/>
+            <p:cNvSpPr/>
+            <p:nvPr/>
+          </p:nvSpPr>
+          <p:spPr>
+            <a:xfrm>
+              <a:off x="7067376" y="1890798"/>
+              <a:ext cx="2286000" cy="828057"/>
+            </a:xfrm>
+            <a:prstGeom prst="rect">
+              <a:avLst/>
+            </a:prstGeom>
+            <a:noFill/>
+            <a:ln>
+              <a:solidFill>
+                <a:schemeClr val="tx1"/>
+              </a:solidFill>
+            </a:ln>
+          </p:spPr>
+          <p:style>
+            <a:lnRef idx="2">
+              <a:schemeClr val="accent1">
+                <a:shade val="50000"/>
+              </a:schemeClr>
+            </a:lnRef>
+            <a:fillRef idx="1">
+              <a:schemeClr val="accent1"/>
+            </a:fillRef>
+            <a:effectRef idx="0">
+              <a:schemeClr val="accent1"/>
+            </a:effectRef>
+            <a:fontRef idx="minor">
+              <a:schemeClr val="lt1"/>
+            </a:fontRef>
+          </p:style>
+          <p:txBody>
+            <a:bodyPr rtlCol="0" anchor="ctr"/>
+            <a:lstStyle/>
+            <a:p>
+              <a:pPr algn="ctr"/>
+              <a:endParaRPr lang="en-US"/>
+            </a:p>
+          </p:txBody>
+        </p:sp>
+        <p:sp>
+          <p:nvSpPr>
+            <p:cNvPr id="27" name="TextBox 26"/>
+            <p:cNvSpPr txBox="1"/>
+            <p:nvPr/>
+          </p:nvSpPr>
+          <p:spPr>
+            <a:xfrm>
+              <a:off x="7099736" y="1958010"/>
+              <a:ext cx="2300558" cy="677108"/>
+            </a:xfrm>
+            <a:prstGeom prst="rect">
+              <a:avLst/>
+            </a:prstGeom>
+            <a:noFill/>
+          </p:spPr>
+          <p:txBody>
+            <a:bodyPr wrap="square" rtlCol="0">
+              <a:spAutoFit/>
+            </a:bodyPr>
+            <a:lstStyle/>
+            <a:p>
+              <a:pPr algn="ctr"/>
+              <a:r>
+                <a:rPr lang="en-US" sz="1400" dirty="0" smtClean="0"/>
+                <a:t>GW Demand </a:t>
+              </a:r>
+              <a:r>
+                <a:rPr lang="en-US" sz="1400" dirty="0" smtClean="0"/>
+                <a:t>set as SW </a:t>
+              </a:r>
+              <a:r>
+                <a:rPr lang="en-US" sz="1400" dirty="0" smtClean="0"/>
+                <a:t>shortfall</a:t>
+              </a:r>
+            </a:p>
+            <a:p>
+              <a:pPr algn="ctr"/>
+              <a:r>
+                <a:rPr lang="en-US" sz="1000" dirty="0" smtClean="0"/>
+                <a:t>(SUPPLEMENTALWELL)</a:t>
+              </a:r>
+              <a:endParaRPr lang="en-US" sz="1000" dirty="0"/>
+            </a:p>
+          </p:txBody>
+        </p:sp>
+      </p:grpSp>
+      <p:cxnSp>
+        <p:nvCxnSpPr>
+          <p:cNvPr id="35" name="Straight Connector 34"/>
+          <p:cNvCxnSpPr/>
+          <p:nvPr/>
+        </p:nvCxnSpPr>
+        <p:spPr>
+          <a:xfrm>
+            <a:off x="2822010" y="2592832"/>
+            <a:ext cx="1234440" cy="0"/>
+          </a:xfrm>
+          <a:prstGeom prst="line">
+            <a:avLst/>
+          </a:prstGeom>
+          <a:ln w="19050">
+            <a:solidFill>
+              <a:schemeClr val="tx1"/>
+            </a:solidFill>
+          </a:ln>
+        </p:spPr>
+        <p:style>
+          <a:lnRef idx="1">
+            <a:schemeClr val="accent1"/>
+          </a:lnRef>
+          <a:fillRef idx="0">
+            <a:schemeClr val="accent1"/>
+          </a:fillRef>
+          <a:effectRef idx="0">
+            <a:schemeClr val="accent1"/>
+          </a:effectRef>
+          <a:fontRef idx="minor">
+            <a:schemeClr val="tx1"/>
+          </a:fontRef>
+        </p:style>
+      </p:cxnSp>
+      <p:cxnSp>
+        <p:nvCxnSpPr>
+          <p:cNvPr id="31" name="Straight Connector 30"/>
+          <p:cNvCxnSpPr/>
+          <p:nvPr/>
+        </p:nvCxnSpPr>
+        <p:spPr>
           <a:xfrm flipV="1">
-            <a:off x="2784025" y="4152041"/>
+            <a:off x="4056450" y="2164696"/>
+            <a:ext cx="0" cy="423229"/>
+          </a:xfrm>
+          <a:prstGeom prst="line">
+            <a:avLst/>
+          </a:prstGeom>
+          <a:ln w="19050">
+            <a:solidFill>
+              <a:schemeClr val="tx1"/>
+            </a:solidFill>
+            <a:headEnd type="triangle" w="med" len="med"/>
+            <a:tailEnd type="none" w="med" len="med"/>
+          </a:ln>
+        </p:spPr>
+        <p:style>
+          <a:lnRef idx="1">
+            <a:schemeClr val="accent1"/>
+          </a:lnRef>
+          <a:fillRef idx="0">
+            <a:schemeClr val="accent1"/>
+          </a:fillRef>
+          <a:effectRef idx="0">
+            <a:schemeClr val="accent1"/>
+          </a:effectRef>
+          <a:fontRef idx="minor">
+            <a:schemeClr val="tx1"/>
+          </a:fontRef>
+        </p:style>
+      </p:cxnSp>
+      <p:grpSp>
+        <p:nvGrpSpPr>
+          <p:cNvPr id="55" name="Group 54"/>
+          <p:cNvGrpSpPr/>
+          <p:nvPr/>
+        </p:nvGrpSpPr>
+        <p:grpSpPr>
+          <a:xfrm>
+            <a:off x="2688792" y="1635808"/>
+            <a:ext cx="2735317" cy="677108"/>
+            <a:chOff x="6432170" y="2284479"/>
+            <a:chExt cx="2735317" cy="677108"/>
+          </a:xfrm>
+        </p:grpSpPr>
+        <p:sp>
+          <p:nvSpPr>
+            <p:cNvPr id="53" name="Rectangle 52"/>
+            <p:cNvSpPr/>
+            <p:nvPr/>
+          </p:nvSpPr>
+          <p:spPr>
+            <a:xfrm>
+              <a:off x="6689967" y="2287869"/>
+              <a:ext cx="2286000" cy="515716"/>
+            </a:xfrm>
+            <a:prstGeom prst="rect">
+              <a:avLst/>
+            </a:prstGeom>
+            <a:noFill/>
+            <a:ln>
+              <a:solidFill>
+                <a:schemeClr val="tx1"/>
+              </a:solidFill>
+            </a:ln>
+          </p:spPr>
+          <p:style>
+            <a:lnRef idx="2">
+              <a:schemeClr val="accent1">
+                <a:shade val="50000"/>
+              </a:schemeClr>
+            </a:lnRef>
+            <a:fillRef idx="1">
+              <a:schemeClr val="accent1"/>
+            </a:fillRef>
+            <a:effectRef idx="0">
+              <a:schemeClr val="accent1"/>
+            </a:effectRef>
+            <a:fontRef idx="minor">
+              <a:schemeClr val="lt1"/>
+            </a:fontRef>
+          </p:style>
+          <p:txBody>
+            <a:bodyPr rtlCol="0" anchor="ctr"/>
+            <a:lstStyle/>
+            <a:p>
+              <a:pPr algn="ctr"/>
+              <a:endParaRPr lang="en-US"/>
+            </a:p>
+          </p:txBody>
+        </p:sp>
+        <p:sp>
+          <p:nvSpPr>
+            <p:cNvPr id="54" name="TextBox 53"/>
+            <p:cNvSpPr txBox="1"/>
+            <p:nvPr/>
+          </p:nvSpPr>
+          <p:spPr>
+            <a:xfrm>
+              <a:off x="6432170" y="2284479"/>
+              <a:ext cx="2735317" cy="677108"/>
+            </a:xfrm>
+            <a:prstGeom prst="rect">
+              <a:avLst/>
+            </a:prstGeom>
+            <a:noFill/>
+          </p:spPr>
+          <p:txBody>
+            <a:bodyPr wrap="square" rtlCol="0">
+              <a:spAutoFit/>
+            </a:bodyPr>
+            <a:lstStyle/>
+            <a:p>
+              <a:pPr algn="ctr"/>
+              <a:r>
+                <a:rPr lang="en-US" sz="1400" dirty="0" smtClean="0"/>
+                <a:t>GW irrigation</a:t>
+              </a:r>
+            </a:p>
+            <a:p>
+              <a:pPr algn="ctr"/>
+              <a:r>
+                <a:rPr lang="en-US" sz="1000" dirty="0" smtClean="0"/>
+                <a:t>(IRRIGATIONWELL)</a:t>
+              </a:r>
+              <a:endParaRPr lang="en-US" sz="1000" dirty="0"/>
+            </a:p>
+            <a:p>
+              <a:pPr algn="ctr"/>
+              <a:endParaRPr lang="en-US" sz="1400" dirty="0"/>
+            </a:p>
+          </p:txBody>
+        </p:sp>
+      </p:grpSp>
+      <p:cxnSp>
+        <p:nvCxnSpPr>
+          <p:cNvPr id="59" name="Straight Arrow Connector 58"/>
+          <p:cNvCxnSpPr/>
+          <p:nvPr/>
+        </p:nvCxnSpPr>
+        <p:spPr>
+          <a:xfrm>
+            <a:off x="2721930" y="1887000"/>
+            <a:ext cx="228600" cy="0"/>
+          </a:xfrm>
+          <a:prstGeom prst="straightConnector1">
+            <a:avLst/>
+          </a:prstGeom>
+          <a:ln w="19050">
+            <a:solidFill>
+              <a:schemeClr val="tx1"/>
+            </a:solidFill>
+            <a:headEnd type="none" w="med" len="med"/>
+            <a:tailEnd type="triangle" w="med" len="med"/>
+          </a:ln>
+        </p:spPr>
+        <p:style>
+          <a:lnRef idx="1">
+            <a:schemeClr val="accent1"/>
+          </a:lnRef>
+          <a:fillRef idx="0">
+            <a:schemeClr val="accent1"/>
+          </a:fillRef>
+          <a:effectRef idx="0">
+            <a:schemeClr val="accent1"/>
+          </a:effectRef>
+          <a:fontRef idx="minor">
+            <a:schemeClr val="tx1"/>
+          </a:fontRef>
+        </p:style>
+      </p:cxnSp>
+      <p:cxnSp>
+        <p:nvCxnSpPr>
+          <p:cNvPr id="66" name="Straight Arrow Connector 65"/>
+          <p:cNvCxnSpPr>
+            <a:endCxn id="54" idx="0"/>
+          </p:cNvCxnSpPr>
+          <p:nvPr/>
+        </p:nvCxnSpPr>
+        <p:spPr>
+          <a:xfrm flipH="1">
+            <a:off x="4056451" y="1015030"/>
+            <a:ext cx="10176" cy="620778"/>
+          </a:xfrm>
+          <a:prstGeom prst="straightConnector1">
+            <a:avLst/>
+          </a:prstGeom>
+          <a:ln w="19050">
+            <a:solidFill>
+              <a:schemeClr val="tx1"/>
+            </a:solidFill>
+            <a:headEnd type="none" w="med" len="med"/>
+            <a:tailEnd type="triangle" w="med" len="med"/>
+          </a:ln>
+        </p:spPr>
+        <p:style>
+          <a:lnRef idx="1">
+            <a:schemeClr val="accent1"/>
+          </a:lnRef>
+          <a:fillRef idx="0">
+            <a:schemeClr val="accent1"/>
+          </a:fillRef>
+          <a:effectRef idx="0">
+            <a:schemeClr val="accent1"/>
+          </a:effectRef>
+          <a:fontRef idx="minor">
+            <a:schemeClr val="tx1"/>
+          </a:fontRef>
+        </p:style>
+      </p:cxnSp>
+      <p:cxnSp>
+        <p:nvCxnSpPr>
+          <p:cNvPr id="70" name="Straight Connector 69"/>
+          <p:cNvCxnSpPr/>
+          <p:nvPr/>
+        </p:nvCxnSpPr>
+        <p:spPr>
+          <a:xfrm flipV="1">
+            <a:off x="2782859" y="4194755"/>
             <a:ext cx="680526" cy="667049"/>
           </a:xfrm>
           <a:prstGeom prst="line">
@@ -3760,53 +4846,46 @@
           </a:fontRef>
         </p:style>
       </p:cxnSp>
-      <p:cxnSp>
-        <p:nvCxnSpPr>
-          <p:cNvPr id="43" name="Straight Arrow Connector 42"/>
-          <p:cNvCxnSpPr/>
-          <p:nvPr/>
-        </p:nvCxnSpPr>
-        <p:spPr>
-          <a:xfrm flipH="1">
-            <a:off x="2783834" y="4824598"/>
-            <a:ext cx="3" cy="225385"/>
-          </a:xfrm>
-          <a:prstGeom prst="straightConnector1">
-            <a:avLst/>
-          </a:prstGeom>
-          <a:ln w="12700">
-            <a:solidFill>
-              <a:schemeClr val="tx1"/>
-            </a:solidFill>
-            <a:headEnd type="none" w="med" len="med"/>
-            <a:tailEnd type="triangle" w="med" len="med"/>
-          </a:ln>
-        </p:spPr>
-        <p:style>
-          <a:lnRef idx="1">
-            <a:schemeClr val="accent1"/>
-          </a:lnRef>
-          <a:fillRef idx="0">
-            <a:schemeClr val="accent1"/>
-          </a:fillRef>
-          <a:effectRef idx="0">
-            <a:schemeClr val="accent1"/>
-          </a:effectRef>
-          <a:fontRef idx="minor">
-            <a:schemeClr val="tx1"/>
-          </a:fontRef>
-        </p:style>
-      </p:cxnSp>
-      <p:sp>
-        <p:nvSpPr>
-          <p:cNvPr id="44" name="Rectangle 43"/>
+    </p:spTree>
+    <p:extLst>
+      <p:ext uri="{BB962C8B-B14F-4D97-AF65-F5344CB8AC3E}">
+        <p14:creationId xmlns:p14="http://schemas.microsoft.com/office/powerpoint/2010/main" val="762815989"/>
+      </p:ext>
+    </p:extLst>
+  </p:cSld>
+  <p:clrMapOvr>
+    <a:masterClrMapping/>
+  </p:clrMapOvr>
+</p:sld>
+</file>
+
+<file path=ppt/slides/slide3.xml><?xml version="1.0" encoding="utf-8"?>
+<p:sld xmlns:a="http://schemas.openxmlformats.org/drawingml/2006/main" xmlns:r="http://schemas.openxmlformats.org/officeDocument/2006/relationships" xmlns:p="http://schemas.openxmlformats.org/presentationml/2006/main">
+  <p:cSld>
+    <p:spTree>
+      <p:nvGrpSpPr>
+        <p:cNvPr id="1" name=""/>
+        <p:cNvGrpSpPr/>
+        <p:nvPr/>
+      </p:nvGrpSpPr>
+      <p:grpSpPr>
+        <a:xfrm>
+          <a:off x="0" y="0"/>
+          <a:ext cx="0" cy="0"/>
+          <a:chOff x="0" y="0"/>
+          <a:chExt cx="0" cy="0"/>
+        </a:xfrm>
+      </p:grpSpPr>
+      <p:sp>
+        <p:nvSpPr>
+          <p:cNvPr id="4" name="Rectangle 3"/>
           <p:cNvSpPr/>
           <p:nvPr/>
         </p:nvSpPr>
         <p:spPr>
           <a:xfrm>
-            <a:off x="1383236" y="5055490"/>
-            <a:ext cx="2801196" cy="955089"/>
+            <a:off x="2242230" y="3959154"/>
+            <a:ext cx="2495871" cy="859220"/>
           </a:xfrm>
           <a:prstGeom prst="rect">
             <a:avLst/>
@@ -3845,14 +4924,14 @@
       </p:sp>
       <p:sp>
         <p:nvSpPr>
-          <p:cNvPr id="45" name="TextBox 44"/>
+          <p:cNvPr id="5" name="TextBox 4"/>
           <p:cNvSpPr txBox="1"/>
           <p:nvPr/>
         </p:nvSpPr>
         <p:spPr>
           <a:xfrm>
-            <a:off x="2384606" y="2638219"/>
-            <a:ext cx="907620" cy="523220"/>
+            <a:off x="2176677" y="3966040"/>
+            <a:ext cx="2561424" cy="892552"/>
           </a:xfrm>
           <a:prstGeom prst="rect">
             <a:avLst/>
@@ -3860,31 +4939,1112 @@
           <a:noFill/>
         </p:spPr>
         <p:txBody>
+          <a:bodyPr wrap="square" rtlCol="0">
+            <a:spAutoFit/>
+          </a:bodyPr>
+          <a:lstStyle/>
+          <a:p>
+            <a:pPr algn="ctr"/>
+            <a:r>
+              <a:rPr lang="en-US" sz="1400" dirty="0" smtClean="0"/>
+              <a:t>SW </a:t>
+            </a:r>
+            <a:r>
+              <a:rPr lang="en-US" sz="1400" dirty="0"/>
+              <a:t>d</a:t>
+            </a:r>
+            <a:r>
+              <a:rPr lang="en-US" sz="1400" dirty="0" smtClean="0"/>
+              <a:t>iversion set as Irrigation demand, and limited by the </a:t>
+            </a:r>
+            <a:r>
+              <a:rPr lang="en-US" sz="1400" dirty="0" smtClean="0"/>
+              <a:t>lesser </a:t>
+            </a:r>
+            <a:r>
+              <a:rPr lang="en-US" sz="1400" dirty="0" smtClean="0"/>
+              <a:t>of “FLOW” and </a:t>
+            </a:r>
+            <a:r>
+              <a:rPr lang="en-US" sz="1400" dirty="0" err="1" smtClean="0"/>
+              <a:t>Qseg</a:t>
+            </a:r>
+            <a:endParaRPr lang="en-US" sz="1400" dirty="0" smtClean="0"/>
+          </a:p>
+          <a:p>
+            <a:pPr algn="ctr"/>
+            <a:r>
+              <a:rPr lang="en-US" sz="1000" dirty="0" smtClean="0"/>
+              <a:t>(</a:t>
+            </a:r>
+            <a:r>
+              <a:rPr lang="en-US" sz="1000" dirty="0" smtClean="0"/>
+              <a:t>IRRIGATIONSEGMENT</a:t>
+            </a:r>
+            <a:r>
+              <a:rPr lang="en-US" sz="1000" dirty="0" smtClean="0"/>
+              <a:t>)</a:t>
+            </a:r>
+            <a:endParaRPr lang="en-US" sz="1000" dirty="0"/>
+          </a:p>
+        </p:txBody>
+      </p:sp>
+      <p:sp>
+        <p:nvSpPr>
+          <p:cNvPr id="6" name="TextBox 5"/>
+          <p:cNvSpPr txBox="1"/>
+          <p:nvPr/>
+        </p:nvSpPr>
+        <p:spPr>
+          <a:xfrm>
+            <a:off x="6310410" y="105386"/>
+            <a:ext cx="4572001" cy="1200329"/>
+          </a:xfrm>
+          <a:prstGeom prst="rect">
+            <a:avLst/>
+          </a:prstGeom>
+          <a:noFill/>
+        </p:spPr>
+        <p:txBody>
+          <a:bodyPr wrap="square" rtlCol="0">
+            <a:spAutoFit/>
+          </a:bodyPr>
+          <a:lstStyle/>
+          <a:p>
+            <a:r>
+              <a:rPr lang="en-US" dirty="0" smtClean="0"/>
+              <a:t>C) Surface water (SW) and groundwater (GW) </a:t>
+            </a:r>
+            <a:r>
+              <a:rPr lang="en-US" dirty="0" smtClean="0"/>
+              <a:t>irrigation using </a:t>
+            </a:r>
+            <a:r>
+              <a:rPr lang="en-US" dirty="0" smtClean="0"/>
+              <a:t>IRRIGATIONSEGMENT and IRRIGATIONWELL; demand calculated as ET </a:t>
+            </a:r>
+            <a:r>
+              <a:rPr lang="en-US" dirty="0" smtClean="0"/>
+              <a:t>deficit using ETDEMAND.</a:t>
+            </a:r>
+            <a:endParaRPr lang="en-US" dirty="0"/>
+          </a:p>
+        </p:txBody>
+      </p:sp>
+      <p:cxnSp>
+        <p:nvCxnSpPr>
+          <p:cNvPr id="8" name="Straight Arrow Connector 7"/>
+          <p:cNvCxnSpPr/>
+          <p:nvPr/>
+        </p:nvCxnSpPr>
+        <p:spPr>
+          <a:xfrm>
+            <a:off x="3481662" y="4818374"/>
+            <a:ext cx="0" cy="304371"/>
+          </a:xfrm>
+          <a:prstGeom prst="straightConnector1">
+            <a:avLst/>
+          </a:prstGeom>
+          <a:ln w="19050">
+            <a:solidFill>
+              <a:schemeClr val="tx1"/>
+            </a:solidFill>
+            <a:headEnd type="none" w="med" len="med"/>
+            <a:tailEnd type="triangle" w="med" len="med"/>
+          </a:ln>
+        </p:spPr>
+        <p:style>
+          <a:lnRef idx="1">
+            <a:schemeClr val="accent1"/>
+          </a:lnRef>
+          <a:fillRef idx="0">
+            <a:schemeClr val="accent1"/>
+          </a:fillRef>
+          <a:effectRef idx="0">
+            <a:schemeClr val="accent1"/>
+          </a:effectRef>
+          <a:fontRef idx="minor">
+            <a:schemeClr val="tx1"/>
+          </a:fontRef>
+        </p:style>
+      </p:cxnSp>
+      <p:grpSp>
+        <p:nvGrpSpPr>
+          <p:cNvPr id="24" name="Group 23"/>
+          <p:cNvGrpSpPr/>
+          <p:nvPr/>
+        </p:nvGrpSpPr>
+        <p:grpSpPr>
+          <a:xfrm>
+            <a:off x="2283264" y="2866831"/>
+            <a:ext cx="2292933" cy="859220"/>
+            <a:chOff x="3001270" y="964346"/>
+            <a:chExt cx="2378396" cy="859220"/>
+          </a:xfrm>
+        </p:grpSpPr>
+        <p:sp>
+          <p:nvSpPr>
+            <p:cNvPr id="25" name="Rectangle 24"/>
+            <p:cNvSpPr/>
+            <p:nvPr/>
+          </p:nvSpPr>
+          <p:spPr>
+            <a:xfrm>
+              <a:off x="3034956" y="964346"/>
+              <a:ext cx="2286000" cy="859220"/>
+            </a:xfrm>
+            <a:prstGeom prst="rect">
+              <a:avLst/>
+            </a:prstGeom>
+            <a:noFill/>
+            <a:ln>
+              <a:solidFill>
+                <a:schemeClr val="tx1"/>
+              </a:solidFill>
+            </a:ln>
+          </p:spPr>
+          <p:style>
+            <a:lnRef idx="2">
+              <a:schemeClr val="accent1">
+                <a:shade val="50000"/>
+              </a:schemeClr>
+            </a:lnRef>
+            <a:fillRef idx="1">
+              <a:schemeClr val="accent1"/>
+            </a:fillRef>
+            <a:effectRef idx="0">
+              <a:schemeClr val="accent1"/>
+            </a:effectRef>
+            <a:fontRef idx="minor">
+              <a:schemeClr val="lt1"/>
+            </a:fontRef>
+          </p:style>
+          <p:txBody>
+            <a:bodyPr rtlCol="0" anchor="ctr"/>
+            <a:lstStyle/>
+            <a:p>
+              <a:pPr algn="ctr"/>
+              <a:endParaRPr lang="en-US"/>
+            </a:p>
+          </p:txBody>
+        </p:sp>
+        <p:sp>
+          <p:nvSpPr>
+            <p:cNvPr id="27" name="TextBox 26"/>
+            <p:cNvSpPr txBox="1"/>
+            <p:nvPr/>
+          </p:nvSpPr>
+          <p:spPr>
+            <a:xfrm>
+              <a:off x="3001270" y="1091212"/>
+              <a:ext cx="2378396" cy="677108"/>
+            </a:xfrm>
+            <a:prstGeom prst="rect">
+              <a:avLst/>
+            </a:prstGeom>
+            <a:noFill/>
+          </p:spPr>
+          <p:txBody>
+            <a:bodyPr wrap="square" rtlCol="0">
+              <a:spAutoFit/>
+            </a:bodyPr>
+            <a:lstStyle/>
+            <a:p>
+              <a:pPr algn="ctr"/>
+              <a:r>
+                <a:rPr lang="en-US" sz="1400" dirty="0" smtClean="0"/>
+                <a:t>Irrigation demand calculated using </a:t>
+              </a:r>
+              <a:r>
+                <a:rPr lang="en-US" sz="1400" dirty="0" smtClean="0"/>
+                <a:t>f(</a:t>
+              </a:r>
+              <a:r>
+                <a:rPr lang="en-US" sz="1400" dirty="0" err="1" smtClean="0"/>
+                <a:t>ET</a:t>
+              </a:r>
+              <a:r>
+                <a:rPr lang="en-US" sz="1400" baseline="-25000" dirty="0" err="1" smtClean="0"/>
+                <a:t>d</a:t>
+              </a:r>
+              <a:r>
+                <a:rPr lang="en-US" sz="1400" dirty="0" err="1" smtClean="0"/>
+                <a:t>-ET</a:t>
+              </a:r>
+              <a:r>
+                <a:rPr lang="en-US" sz="1400" baseline="-25000" dirty="0" err="1" smtClean="0"/>
+                <a:t>a</a:t>
+              </a:r>
+              <a:r>
+                <a:rPr lang="en-US" sz="1400" dirty="0"/>
+                <a:t>)</a:t>
+              </a:r>
+              <a:endParaRPr lang="en-US" sz="1400" baseline="-25000" dirty="0" smtClean="0"/>
+            </a:p>
+            <a:p>
+              <a:pPr algn="ctr"/>
+              <a:r>
+                <a:rPr lang="en-US" sz="1000" dirty="0" smtClean="0"/>
+                <a:t>(ETDEMAND)</a:t>
+              </a:r>
+              <a:endParaRPr lang="en-US" sz="1000" dirty="0"/>
+            </a:p>
+          </p:txBody>
+        </p:sp>
+      </p:grpSp>
+      <p:sp>
+        <p:nvSpPr>
+          <p:cNvPr id="37" name="Rectangle 36"/>
+          <p:cNvSpPr/>
+          <p:nvPr/>
+        </p:nvSpPr>
+        <p:spPr>
+          <a:xfrm>
+            <a:off x="2584009" y="1856334"/>
+            <a:ext cx="1723696" cy="765663"/>
+          </a:xfrm>
+          <a:prstGeom prst="rect">
+            <a:avLst/>
+          </a:prstGeom>
+          <a:noFill/>
+          <a:ln>
+            <a:solidFill>
+              <a:schemeClr val="tx1"/>
+            </a:solidFill>
+          </a:ln>
+        </p:spPr>
+        <p:style>
+          <a:lnRef idx="2">
+            <a:schemeClr val="accent1">
+              <a:shade val="50000"/>
+            </a:schemeClr>
+          </a:lnRef>
+          <a:fillRef idx="1">
+            <a:schemeClr val="accent1"/>
+          </a:fillRef>
+          <a:effectRef idx="0">
+            <a:schemeClr val="accent1"/>
+          </a:effectRef>
+          <a:fontRef idx="minor">
+            <a:schemeClr val="lt1"/>
+          </a:fontRef>
+        </p:style>
+        <p:txBody>
+          <a:bodyPr rtlCol="0" anchor="ctr"/>
+          <a:lstStyle/>
+          <a:p>
+            <a:pPr algn="ctr"/>
+            <a:endParaRPr lang="en-US"/>
+          </a:p>
+        </p:txBody>
+      </p:sp>
+      <p:sp>
+        <p:nvSpPr>
+          <p:cNvPr id="40" name="TextBox 39"/>
+          <p:cNvSpPr txBox="1"/>
+          <p:nvPr/>
+        </p:nvSpPr>
+        <p:spPr>
+          <a:xfrm>
+            <a:off x="2594378" y="1971528"/>
+            <a:ext cx="1723696" cy="523220"/>
+          </a:xfrm>
+          <a:prstGeom prst="rect">
+            <a:avLst/>
+          </a:prstGeom>
+          <a:noFill/>
+        </p:spPr>
+        <p:txBody>
+          <a:bodyPr wrap="square" rtlCol="0">
+            <a:spAutoFit/>
+          </a:bodyPr>
+          <a:lstStyle/>
+          <a:p>
+            <a:pPr algn="ctr"/>
+            <a:r>
+              <a:rPr lang="en-US" sz="1400" dirty="0" err="1" smtClean="0"/>
+              <a:t>ETa</a:t>
+            </a:r>
+            <a:r>
+              <a:rPr lang="en-US" sz="1400" dirty="0" smtClean="0"/>
+              <a:t> </a:t>
+            </a:r>
+            <a:r>
+              <a:rPr lang="en-US" sz="1400" dirty="0" smtClean="0"/>
+              <a:t>is calculated by UZF/PRMS</a:t>
+            </a:r>
+            <a:endParaRPr lang="en-US" sz="1400" dirty="0"/>
+          </a:p>
+        </p:txBody>
+      </p:sp>
+      <p:cxnSp>
+        <p:nvCxnSpPr>
+          <p:cNvPr id="41" name="Straight Arrow Connector 40"/>
+          <p:cNvCxnSpPr/>
+          <p:nvPr/>
+        </p:nvCxnSpPr>
+        <p:spPr>
+          <a:xfrm>
+            <a:off x="3441299" y="2632014"/>
+            <a:ext cx="0" cy="225385"/>
+          </a:xfrm>
+          <a:prstGeom prst="straightConnector1">
+            <a:avLst/>
+          </a:prstGeom>
+          <a:ln w="19050">
+            <a:solidFill>
+              <a:schemeClr val="tx1"/>
+            </a:solidFill>
+            <a:headEnd type="none" w="med" len="med"/>
+            <a:tailEnd type="triangle" w="med" len="med"/>
+          </a:ln>
+        </p:spPr>
+        <p:style>
+          <a:lnRef idx="1">
+            <a:schemeClr val="accent1"/>
+          </a:lnRef>
+          <a:fillRef idx="0">
+            <a:schemeClr val="accent1"/>
+          </a:fillRef>
+          <a:effectRef idx="0">
+            <a:schemeClr val="accent1"/>
+          </a:effectRef>
+          <a:fontRef idx="minor">
+            <a:schemeClr val="tx1"/>
+          </a:fontRef>
+        </p:style>
+      </p:cxnSp>
+      <p:grpSp>
+        <p:nvGrpSpPr>
+          <p:cNvPr id="42" name="Group 41"/>
+          <p:cNvGrpSpPr/>
+          <p:nvPr/>
+        </p:nvGrpSpPr>
+        <p:grpSpPr>
+          <a:xfrm>
+            <a:off x="2242230" y="5113758"/>
+            <a:ext cx="2487723" cy="1074429"/>
+            <a:chOff x="2476728" y="3057301"/>
+            <a:chExt cx="2487723" cy="1074429"/>
+          </a:xfrm>
+        </p:grpSpPr>
+        <p:sp>
+          <p:nvSpPr>
+            <p:cNvPr id="46" name="Rectangle 45"/>
+            <p:cNvSpPr/>
+            <p:nvPr/>
+          </p:nvSpPr>
+          <p:spPr>
+            <a:xfrm>
+              <a:off x="2552826" y="3057301"/>
+              <a:ext cx="2286000" cy="859220"/>
+            </a:xfrm>
+            <a:prstGeom prst="rect">
+              <a:avLst/>
+            </a:prstGeom>
+            <a:noFill/>
+            <a:ln>
+              <a:solidFill>
+                <a:schemeClr val="tx1"/>
+              </a:solidFill>
+            </a:ln>
+          </p:spPr>
+          <p:style>
+            <a:lnRef idx="2">
+              <a:schemeClr val="accent1">
+                <a:shade val="50000"/>
+              </a:schemeClr>
+            </a:lnRef>
+            <a:fillRef idx="1">
+              <a:schemeClr val="accent1"/>
+            </a:fillRef>
+            <a:effectRef idx="0">
+              <a:schemeClr val="accent1"/>
+            </a:effectRef>
+            <a:fontRef idx="minor">
+              <a:schemeClr val="lt1"/>
+            </a:fontRef>
+          </p:style>
+          <p:txBody>
+            <a:bodyPr rtlCol="0" anchor="ctr"/>
+            <a:lstStyle/>
+            <a:p>
+              <a:pPr algn="ctr"/>
+              <a:endParaRPr lang="en-US"/>
+            </a:p>
+          </p:txBody>
+        </p:sp>
+        <p:sp>
+          <p:nvSpPr>
+            <p:cNvPr id="47" name="TextBox 46"/>
+            <p:cNvSpPr txBox="1"/>
+            <p:nvPr/>
+          </p:nvSpPr>
+          <p:spPr>
+            <a:xfrm>
+              <a:off x="2476728" y="3085290"/>
+              <a:ext cx="2487723" cy="1046440"/>
+            </a:xfrm>
+            <a:prstGeom prst="rect">
+              <a:avLst/>
+            </a:prstGeom>
+            <a:noFill/>
+          </p:spPr>
+          <p:txBody>
+            <a:bodyPr wrap="square" rtlCol="0">
+              <a:spAutoFit/>
+            </a:bodyPr>
+            <a:lstStyle/>
+            <a:p>
+              <a:pPr algn="ctr"/>
+              <a:r>
+                <a:rPr lang="en-US" sz="1400" dirty="0" smtClean="0"/>
+                <a:t>Supplemental GW pumping rate set as SW shortfall</a:t>
+              </a:r>
+            </a:p>
+            <a:p>
+              <a:pPr algn="ctr"/>
+              <a:r>
+                <a:rPr lang="en-US" sz="1000" dirty="0"/>
+                <a:t>(</a:t>
+              </a:r>
+              <a:r>
+                <a:rPr lang="en-US" sz="1000" dirty="0" smtClean="0"/>
+                <a:t>IRRIGATIONWELL)</a:t>
+              </a:r>
+            </a:p>
+            <a:p>
+              <a:pPr algn="ctr"/>
+              <a:r>
+                <a:rPr lang="en-US" sz="1000" dirty="0" smtClean="0"/>
+                <a:t>(SUPPLEMENTALWELL)</a:t>
+              </a:r>
+              <a:endParaRPr lang="en-US" sz="1000" dirty="0"/>
+            </a:p>
+            <a:p>
+              <a:pPr algn="ctr"/>
+              <a:endParaRPr lang="en-US" sz="1400" dirty="0"/>
+            </a:p>
+          </p:txBody>
+        </p:sp>
+      </p:grpSp>
+      <p:cxnSp>
+        <p:nvCxnSpPr>
+          <p:cNvPr id="48" name="Straight Arrow Connector 47"/>
+          <p:cNvCxnSpPr/>
+          <p:nvPr/>
+        </p:nvCxnSpPr>
+        <p:spPr>
+          <a:xfrm>
+            <a:off x="3456226" y="3726051"/>
+            <a:ext cx="0" cy="225385"/>
+          </a:xfrm>
+          <a:prstGeom prst="straightConnector1">
+            <a:avLst/>
+          </a:prstGeom>
+          <a:ln w="19050">
+            <a:solidFill>
+              <a:schemeClr val="tx1"/>
+            </a:solidFill>
+            <a:headEnd type="none" w="med" len="med"/>
+            <a:tailEnd type="triangle" w="med" len="med"/>
+          </a:ln>
+        </p:spPr>
+        <p:style>
+          <a:lnRef idx="1">
+            <a:schemeClr val="accent1"/>
+          </a:lnRef>
+          <a:fillRef idx="0">
+            <a:schemeClr val="accent1"/>
+          </a:fillRef>
+          <a:effectRef idx="0">
+            <a:schemeClr val="accent1"/>
+          </a:effectRef>
+          <a:fontRef idx="minor">
+            <a:schemeClr val="tx1"/>
+          </a:fontRef>
+        </p:style>
+      </p:cxnSp>
+      <p:sp>
+        <p:nvSpPr>
+          <p:cNvPr id="16" name="TextBox 15"/>
+          <p:cNvSpPr txBox="1"/>
+          <p:nvPr/>
+        </p:nvSpPr>
+        <p:spPr>
+          <a:xfrm>
+            <a:off x="3490165" y="4805747"/>
+            <a:ext cx="1906997" cy="276999"/>
+          </a:xfrm>
+          <a:prstGeom prst="rect">
+            <a:avLst/>
+          </a:prstGeom>
+          <a:noFill/>
+        </p:spPr>
+        <p:txBody>
           <a:bodyPr wrap="none" rtlCol="0">
             <a:spAutoFit/>
           </a:bodyPr>
           <a:lstStyle/>
           <a:p>
+            <a:r>
+              <a:rPr lang="en-US" sz="1200" dirty="0" smtClean="0"/>
+              <a:t>Diversion less than demand</a:t>
+            </a:r>
+            <a:endParaRPr lang="en-US" sz="1200" dirty="0"/>
+          </a:p>
+        </p:txBody>
+      </p:sp>
+      <p:cxnSp>
+        <p:nvCxnSpPr>
+          <p:cNvPr id="29" name="Straight Connector 28"/>
+          <p:cNvCxnSpPr/>
+          <p:nvPr/>
+        </p:nvCxnSpPr>
+        <p:spPr>
+          <a:xfrm flipH="1">
+            <a:off x="1915510" y="5543368"/>
+            <a:ext cx="400230" cy="0"/>
+          </a:xfrm>
+          <a:prstGeom prst="line">
+            <a:avLst/>
+          </a:prstGeom>
+          <a:ln w="19050">
+            <a:solidFill>
+              <a:schemeClr val="tx1"/>
+            </a:solidFill>
+          </a:ln>
+        </p:spPr>
+        <p:style>
+          <a:lnRef idx="1">
+            <a:schemeClr val="accent1"/>
+          </a:lnRef>
+          <a:fillRef idx="0">
+            <a:schemeClr val="accent1"/>
+          </a:fillRef>
+          <a:effectRef idx="0">
+            <a:schemeClr val="accent1"/>
+          </a:effectRef>
+          <a:fontRef idx="minor">
+            <a:schemeClr val="tx1"/>
+          </a:fontRef>
+        </p:style>
+      </p:cxnSp>
+      <p:cxnSp>
+        <p:nvCxnSpPr>
+          <p:cNvPr id="32" name="Straight Connector 31"/>
+          <p:cNvCxnSpPr/>
+          <p:nvPr/>
+        </p:nvCxnSpPr>
+        <p:spPr>
+          <a:xfrm flipV="1">
+            <a:off x="1923393" y="3465307"/>
+            <a:ext cx="10251" cy="2073474"/>
+          </a:xfrm>
+          <a:prstGeom prst="line">
+            <a:avLst/>
+          </a:prstGeom>
+          <a:ln w="19050">
+            <a:solidFill>
+              <a:schemeClr val="tx1"/>
+            </a:solidFill>
+          </a:ln>
+        </p:spPr>
+        <p:style>
+          <a:lnRef idx="1">
+            <a:schemeClr val="accent1"/>
+          </a:lnRef>
+          <a:fillRef idx="0">
+            <a:schemeClr val="accent1"/>
+          </a:fillRef>
+          <a:effectRef idx="0">
+            <a:schemeClr val="accent1"/>
+          </a:effectRef>
+          <a:fontRef idx="minor">
+            <a:schemeClr val="tx1"/>
+          </a:fontRef>
+        </p:style>
+      </p:cxnSp>
+      <p:cxnSp>
+        <p:nvCxnSpPr>
+          <p:cNvPr id="50" name="Straight Arrow Connector 49"/>
+          <p:cNvCxnSpPr>
+            <a:endCxn id="37" idx="1"/>
+          </p:cNvCxnSpPr>
+          <p:nvPr/>
+        </p:nvCxnSpPr>
+        <p:spPr>
+          <a:xfrm>
+            <a:off x="1915510" y="2239040"/>
+            <a:ext cx="668499" cy="126"/>
+          </a:xfrm>
+          <a:prstGeom prst="straightConnector1">
+            <a:avLst/>
+          </a:prstGeom>
+          <a:ln w="19050">
+            <a:solidFill>
+              <a:schemeClr val="tx1"/>
+            </a:solidFill>
+            <a:tailEnd type="triangle"/>
+          </a:ln>
+        </p:spPr>
+        <p:style>
+          <a:lnRef idx="1">
+            <a:schemeClr val="accent1"/>
+          </a:lnRef>
+          <a:fillRef idx="0">
+            <a:schemeClr val="accent1"/>
+          </a:fillRef>
+          <a:effectRef idx="0">
+            <a:schemeClr val="accent1"/>
+          </a:effectRef>
+          <a:fontRef idx="minor">
+            <a:schemeClr val="tx1"/>
+          </a:fontRef>
+        </p:style>
+      </p:cxnSp>
+      <p:cxnSp>
+        <p:nvCxnSpPr>
+          <p:cNvPr id="54" name="Straight Connector 53"/>
+          <p:cNvCxnSpPr/>
+          <p:nvPr/>
+        </p:nvCxnSpPr>
+        <p:spPr>
+          <a:xfrm flipH="1">
+            <a:off x="1933738" y="4382335"/>
+            <a:ext cx="316021" cy="0"/>
+          </a:xfrm>
+          <a:prstGeom prst="line">
+            <a:avLst/>
+          </a:prstGeom>
+          <a:ln w="19050">
+            <a:solidFill>
+              <a:schemeClr val="tx1"/>
+            </a:solidFill>
+          </a:ln>
+        </p:spPr>
+        <p:style>
+          <a:lnRef idx="1">
+            <a:schemeClr val="accent1"/>
+          </a:lnRef>
+          <a:fillRef idx="0">
+            <a:schemeClr val="accent1"/>
+          </a:fillRef>
+          <a:effectRef idx="0">
+            <a:schemeClr val="accent1"/>
+          </a:effectRef>
+          <a:fontRef idx="minor">
+            <a:schemeClr val="tx1"/>
+          </a:fontRef>
+        </p:style>
+      </p:cxnSp>
+      <p:sp>
+        <p:nvSpPr>
+          <p:cNvPr id="55" name="TextBox 54"/>
+          <p:cNvSpPr txBox="1"/>
+          <p:nvPr/>
+        </p:nvSpPr>
+        <p:spPr>
+          <a:xfrm>
+            <a:off x="712507" y="1972532"/>
+            <a:ext cx="1919372" cy="276999"/>
+          </a:xfrm>
+          <a:prstGeom prst="rect">
+            <a:avLst/>
+          </a:prstGeom>
+          <a:noFill/>
+        </p:spPr>
+        <p:txBody>
+          <a:bodyPr wrap="none" rtlCol="0">
+            <a:spAutoFit/>
+          </a:bodyPr>
+          <a:lstStyle/>
+          <a:p>
+            <a:r>
+              <a:rPr lang="en-US" sz="1200" dirty="0" smtClean="0"/>
+              <a:t>Apply SW and GW irrigation</a:t>
+            </a:r>
+            <a:endParaRPr lang="en-US" sz="1200" dirty="0"/>
+          </a:p>
+        </p:txBody>
+      </p:sp>
+      <p:sp>
+        <p:nvSpPr>
+          <p:cNvPr id="49" name="TextBox 48"/>
+          <p:cNvSpPr txBox="1"/>
+          <p:nvPr/>
+        </p:nvSpPr>
+        <p:spPr>
+          <a:xfrm>
+            <a:off x="961006" y="5383814"/>
+            <a:ext cx="974241" cy="276999"/>
+          </a:xfrm>
+          <a:prstGeom prst="rect">
+            <a:avLst/>
+          </a:prstGeom>
+          <a:noFill/>
+        </p:spPr>
+        <p:txBody>
+          <a:bodyPr wrap="none" rtlCol="0">
+            <a:spAutoFit/>
+          </a:bodyPr>
+          <a:lstStyle/>
+          <a:p>
+            <a:r>
+              <a:rPr lang="en-US" sz="1200" dirty="0" smtClean="0"/>
+              <a:t>Pumped GW</a:t>
+            </a:r>
+            <a:endParaRPr lang="en-US" sz="1200" dirty="0"/>
+          </a:p>
+        </p:txBody>
+      </p:sp>
+      <p:cxnSp>
+        <p:nvCxnSpPr>
+          <p:cNvPr id="51" name="Straight Arrow Connector 50"/>
+          <p:cNvCxnSpPr/>
+          <p:nvPr/>
+        </p:nvCxnSpPr>
+        <p:spPr>
+          <a:xfrm>
+            <a:off x="3417668" y="1534560"/>
+            <a:ext cx="0" cy="304371"/>
+          </a:xfrm>
+          <a:prstGeom prst="straightConnector1">
+            <a:avLst/>
+          </a:prstGeom>
+          <a:ln w="19050">
+            <a:solidFill>
+              <a:schemeClr val="tx1"/>
+            </a:solidFill>
+            <a:headEnd type="none" w="med" len="med"/>
+            <a:tailEnd type="triangle" w="med" len="med"/>
+          </a:ln>
+        </p:spPr>
+        <p:style>
+          <a:lnRef idx="1">
+            <a:schemeClr val="accent1"/>
+          </a:lnRef>
+          <a:fillRef idx="0">
+            <a:schemeClr val="accent1"/>
+          </a:fillRef>
+          <a:effectRef idx="0">
+            <a:schemeClr val="accent1"/>
+          </a:effectRef>
+          <a:fontRef idx="minor">
+            <a:schemeClr val="tx1"/>
+          </a:fontRef>
+        </p:style>
+      </p:cxnSp>
+      <p:sp>
+        <p:nvSpPr>
+          <p:cNvPr id="3" name="Rectangle 2"/>
+          <p:cNvSpPr/>
+          <p:nvPr/>
+        </p:nvSpPr>
+        <p:spPr>
+          <a:xfrm>
+            <a:off x="2165414" y="1009750"/>
+            <a:ext cx="2551767" cy="523220"/>
+          </a:xfrm>
+          <a:prstGeom prst="rect">
+            <a:avLst/>
+          </a:prstGeom>
+        </p:spPr>
+        <p:txBody>
+          <a:bodyPr wrap="square">
+            <a:spAutoFit/>
+          </a:bodyPr>
+          <a:lstStyle/>
+          <a:p>
             <a:pPr algn="ctr"/>
             <a:r>
               <a:rPr lang="en-US" sz="1400" dirty="0" smtClean="0"/>
-              <a:t>Diversion </a:t>
-            </a:r>
-          </a:p>
+              <a:t>Externally (UZF) or internally (PRMS) calculated </a:t>
+            </a:r>
+            <a:r>
+              <a:rPr lang="en-US" sz="1400" dirty="0" err="1" smtClean="0"/>
+              <a:t>ET</a:t>
+            </a:r>
+            <a:r>
+              <a:rPr lang="en-US" sz="1400" baseline="-25000" dirty="0" err="1" smtClean="0"/>
+              <a:t>d</a:t>
+            </a:r>
+            <a:endParaRPr lang="en-US" sz="1400" baseline="-25000" dirty="0"/>
+          </a:p>
+        </p:txBody>
+      </p:sp>
+      <p:sp>
+        <p:nvSpPr>
+          <p:cNvPr id="52" name="Rectangle 51"/>
+          <p:cNvSpPr/>
+          <p:nvPr/>
+        </p:nvSpPr>
+        <p:spPr>
+          <a:xfrm>
+            <a:off x="2165181" y="992347"/>
+            <a:ext cx="2495871" cy="545144"/>
+          </a:xfrm>
+          <a:prstGeom prst="rect">
+            <a:avLst/>
+          </a:prstGeom>
+          <a:noFill/>
+          <a:ln>
+            <a:solidFill>
+              <a:schemeClr val="tx1"/>
+            </a:solidFill>
+          </a:ln>
+        </p:spPr>
+        <p:style>
+          <a:lnRef idx="2">
+            <a:schemeClr val="accent1">
+              <a:shade val="50000"/>
+            </a:schemeClr>
+          </a:lnRef>
+          <a:fillRef idx="1">
+            <a:schemeClr val="accent1"/>
+          </a:fillRef>
+          <a:effectRef idx="0">
+            <a:schemeClr val="accent1"/>
+          </a:effectRef>
+          <a:fontRef idx="minor">
+            <a:schemeClr val="lt1"/>
+          </a:fontRef>
+        </p:style>
+        <p:txBody>
+          <a:bodyPr rtlCol="0" anchor="ctr"/>
+          <a:lstStyle/>
           <a:p>
             <a:pPr algn="ctr"/>
+            <a:endParaRPr lang="en-US"/>
+          </a:p>
+        </p:txBody>
+      </p:sp>
+      <p:sp>
+        <p:nvSpPr>
+          <p:cNvPr id="53" name="TextBox 52"/>
+          <p:cNvSpPr txBox="1"/>
+          <p:nvPr/>
+        </p:nvSpPr>
+        <p:spPr>
+          <a:xfrm>
+            <a:off x="974214" y="4250264"/>
+            <a:ext cx="959430" cy="276999"/>
+          </a:xfrm>
+          <a:prstGeom prst="rect">
+            <a:avLst/>
+          </a:prstGeom>
+          <a:noFill/>
+        </p:spPr>
+        <p:txBody>
+          <a:bodyPr wrap="none" rtlCol="0">
+            <a:spAutoFit/>
+          </a:bodyPr>
+          <a:lstStyle/>
+          <a:p>
+            <a:r>
+              <a:rPr lang="en-US" sz="1200" dirty="0" smtClean="0"/>
+              <a:t>Diverted SW</a:t>
+            </a:r>
+            <a:endParaRPr lang="en-US" sz="1200" dirty="0"/>
+          </a:p>
+        </p:txBody>
+      </p:sp>
+      <p:sp>
+        <p:nvSpPr>
+          <p:cNvPr id="56" name="TextBox 55"/>
+          <p:cNvSpPr txBox="1"/>
+          <p:nvPr/>
+        </p:nvSpPr>
+        <p:spPr>
+          <a:xfrm>
+            <a:off x="1455532" y="3011361"/>
+            <a:ext cx="959430" cy="461665"/>
+          </a:xfrm>
+          <a:prstGeom prst="rect">
+            <a:avLst/>
+          </a:prstGeom>
+          <a:noFill/>
+        </p:spPr>
+        <p:txBody>
+          <a:bodyPr wrap="square" rtlCol="0">
+            <a:spAutoFit/>
+          </a:bodyPr>
+          <a:lstStyle/>
+          <a:p>
+            <a:r>
+              <a:rPr lang="en-US" sz="1200" dirty="0" smtClean="0"/>
+              <a:t>Nonlinear iterations</a:t>
+            </a:r>
+            <a:endParaRPr lang="en-US" sz="1200" dirty="0"/>
+          </a:p>
+        </p:txBody>
+      </p:sp>
+      <p:cxnSp>
+        <p:nvCxnSpPr>
+          <p:cNvPr id="57" name="Straight Connector 56"/>
+          <p:cNvCxnSpPr>
+            <a:stCxn id="56" idx="0"/>
+          </p:cNvCxnSpPr>
+          <p:nvPr/>
+        </p:nvCxnSpPr>
+        <p:spPr>
+          <a:xfrm flipH="1" flipV="1">
+            <a:off x="1915510" y="2239040"/>
+            <a:ext cx="0" cy="772321"/>
+          </a:xfrm>
+          <a:prstGeom prst="line">
+            <a:avLst/>
+          </a:prstGeom>
+          <a:ln w="19050">
+            <a:solidFill>
+              <a:schemeClr val="tx1"/>
+            </a:solidFill>
+          </a:ln>
+        </p:spPr>
+        <p:style>
+          <a:lnRef idx="1">
+            <a:schemeClr val="accent1"/>
+          </a:lnRef>
+          <a:fillRef idx="0">
+            <a:schemeClr val="accent1"/>
+          </a:fillRef>
+          <a:effectRef idx="0">
+            <a:schemeClr val="accent1"/>
+          </a:effectRef>
+          <a:fontRef idx="minor">
+            <a:schemeClr val="tx1"/>
+          </a:fontRef>
+        </p:style>
+      </p:cxnSp>
+      <p:sp>
+        <p:nvSpPr>
+          <p:cNvPr id="59" name="TextBox 58"/>
+          <p:cNvSpPr txBox="1"/>
+          <p:nvPr/>
+        </p:nvSpPr>
+        <p:spPr>
+          <a:xfrm>
+            <a:off x="4364931" y="2013177"/>
+            <a:ext cx="2397980" cy="523220"/>
+          </a:xfrm>
+          <a:prstGeom prst="rect">
+            <a:avLst/>
+          </a:prstGeom>
+          <a:noFill/>
+        </p:spPr>
+        <p:txBody>
+          <a:bodyPr wrap="square" rtlCol="0">
+            <a:spAutoFit/>
+          </a:bodyPr>
+          <a:lstStyle/>
+          <a:p>
+            <a:pPr algn="ctr"/>
+            <a:r>
+              <a:rPr lang="en-US" sz="1400" dirty="0"/>
+              <a:t>Return flows </a:t>
+            </a:r>
             <a:r>
               <a:rPr lang="en-US" sz="1400" dirty="0" smtClean="0"/>
-              <a:t>flows</a:t>
+              <a:t>(SW+GW) calculated </a:t>
+            </a:r>
+            <a:r>
+              <a:rPr lang="en-US" sz="1400" dirty="0"/>
+              <a:t>by </a:t>
+            </a:r>
+            <a:r>
+              <a:rPr lang="en-US" sz="1400" dirty="0" smtClean="0"/>
+              <a:t>UZF/PRMS</a:t>
             </a:r>
             <a:endParaRPr lang="en-US" sz="1400" dirty="0"/>
           </a:p>
         </p:txBody>
       </p:sp>
+      <p:sp>
+        <p:nvSpPr>
+          <p:cNvPr id="60" name="Rectangle 59"/>
+          <p:cNvSpPr/>
+          <p:nvPr/>
+        </p:nvSpPr>
+        <p:spPr>
+          <a:xfrm>
+            <a:off x="4592504" y="1894997"/>
+            <a:ext cx="1931010" cy="715871"/>
+          </a:xfrm>
+          <a:prstGeom prst="rect">
+            <a:avLst/>
+          </a:prstGeom>
+          <a:noFill/>
+          <a:ln>
+            <a:solidFill>
+              <a:schemeClr val="tx1"/>
+            </a:solidFill>
+          </a:ln>
+        </p:spPr>
+        <p:style>
+          <a:lnRef idx="2">
+            <a:schemeClr val="accent1">
+              <a:shade val="50000"/>
+            </a:schemeClr>
+          </a:lnRef>
+          <a:fillRef idx="1">
+            <a:schemeClr val="accent1"/>
+          </a:fillRef>
+          <a:effectRef idx="0">
+            <a:schemeClr val="accent1"/>
+          </a:effectRef>
+          <a:fontRef idx="minor">
+            <a:schemeClr val="lt1"/>
+          </a:fontRef>
+        </p:style>
+        <p:txBody>
+          <a:bodyPr rtlCol="0" anchor="ctr"/>
+          <a:lstStyle/>
+          <a:p>
+            <a:pPr algn="ctr"/>
+            <a:endParaRPr lang="en-US"/>
+          </a:p>
+        </p:txBody>
+      </p:sp>
+      <p:cxnSp>
+        <p:nvCxnSpPr>
+          <p:cNvPr id="61" name="Straight Arrow Connector 60"/>
+          <p:cNvCxnSpPr/>
+          <p:nvPr/>
+        </p:nvCxnSpPr>
+        <p:spPr>
+          <a:xfrm>
+            <a:off x="4307705" y="2239040"/>
+            <a:ext cx="296623" cy="0"/>
+          </a:xfrm>
+          <a:prstGeom prst="straightConnector1">
+            <a:avLst/>
+          </a:prstGeom>
+          <a:ln w="19050">
+            <a:solidFill>
+              <a:schemeClr val="tx1"/>
+            </a:solidFill>
+            <a:tailEnd type="triangle"/>
+          </a:ln>
+        </p:spPr>
+        <p:style>
+          <a:lnRef idx="1">
+            <a:schemeClr val="accent1"/>
+          </a:lnRef>
+          <a:fillRef idx="0">
+            <a:schemeClr val="accent1"/>
+          </a:fillRef>
+          <a:effectRef idx="0">
+            <a:schemeClr val="accent1"/>
+          </a:effectRef>
+          <a:fontRef idx="minor">
+            <a:schemeClr val="tx1"/>
+          </a:fontRef>
+        </p:style>
+      </p:cxnSp>
     </p:spTree>
     <p:extLst>
       <p:ext uri="{BB962C8B-B14F-4D97-AF65-F5344CB8AC3E}">
-        <p14:creationId xmlns:p14="http://schemas.microsoft.com/office/powerpoint/2010/main" val="3448900807"/>
+        <p14:creationId xmlns:p14="http://schemas.microsoft.com/office/powerpoint/2010/main" val="1970704118"/>
       </p:ext>
     </p:extLst>
   </p:cSld>

</xml_diff>

<commit_message>
work on flow chart illustrations
</commit_message>
<xml_diff>
--- a/Examples/AgOptions/Options.pptx
+++ b/Examples/AgOptions/Options.pptx
@@ -5322,7 +5322,7 @@
         </p:nvGrpSpPr>
         <p:grpSpPr>
           <a:xfrm>
-            <a:off x="2242230" y="5113758"/>
+            <a:off x="7527232" y="5848053"/>
             <a:ext cx="2487723" cy="1074429"/>
             <a:chOff x="2476728" y="3057301"/>
             <a:chExt cx="2487723" cy="1074429"/>
@@ -5503,8 +5503,8 @@
         </p:nvCxnSpPr>
         <p:spPr>
           <a:xfrm flipH="1">
-            <a:off x="1915510" y="5543368"/>
-            <a:ext cx="400230" cy="0"/>
+            <a:off x="1941388" y="6383792"/>
+            <a:ext cx="365760" cy="0"/>
           </a:xfrm>
           <a:prstGeom prst="line">
             <a:avLst/>
@@ -5537,9 +5537,9 @@
           <p:nvPr/>
         </p:nvCxnSpPr>
         <p:spPr>
-          <a:xfrm flipV="1">
-            <a:off x="1923393" y="3465307"/>
-            <a:ext cx="10251" cy="2073474"/>
+          <a:xfrm flipH="1" flipV="1">
+            <a:off x="1933644" y="3465307"/>
+            <a:ext cx="0" cy="2926080"/>
           </a:xfrm>
           <a:prstGeom prst="line">
             <a:avLst/>
@@ -6041,6 +6041,374 @@
           </a:fontRef>
         </p:style>
       </p:cxnSp>
+      <p:sp>
+        <p:nvSpPr>
+          <p:cNvPr id="63" name="Rectangle 62"/>
+          <p:cNvSpPr/>
+          <p:nvPr/>
+        </p:nvSpPr>
+        <p:spPr>
+          <a:xfrm>
+            <a:off x="5070756" y="2947134"/>
+            <a:ext cx="2659417" cy="725990"/>
+          </a:xfrm>
+          <a:prstGeom prst="rect">
+            <a:avLst/>
+          </a:prstGeom>
+          <a:noFill/>
+          <a:ln>
+            <a:solidFill>
+              <a:schemeClr val="tx1"/>
+            </a:solidFill>
+          </a:ln>
+        </p:spPr>
+        <p:style>
+          <a:lnRef idx="2">
+            <a:schemeClr val="accent1">
+              <a:shade val="50000"/>
+            </a:schemeClr>
+          </a:lnRef>
+          <a:fillRef idx="1">
+            <a:schemeClr val="accent1"/>
+          </a:fillRef>
+          <a:effectRef idx="0">
+            <a:schemeClr val="accent1"/>
+          </a:effectRef>
+          <a:fontRef idx="minor">
+            <a:schemeClr val="lt1"/>
+          </a:fontRef>
+        </p:style>
+        <p:txBody>
+          <a:bodyPr rtlCol="0" anchor="ctr"/>
+          <a:lstStyle/>
+          <a:p>
+            <a:pPr algn="ctr"/>
+            <a:endParaRPr lang="en-US"/>
+          </a:p>
+        </p:txBody>
+      </p:sp>
+      <p:sp>
+        <p:nvSpPr>
+          <p:cNvPr id="64" name="TextBox 63"/>
+          <p:cNvSpPr txBox="1"/>
+          <p:nvPr/>
+        </p:nvSpPr>
+        <p:spPr>
+          <a:xfrm>
+            <a:off x="5045053" y="2949655"/>
+            <a:ext cx="2735317" cy="738664"/>
+          </a:xfrm>
+          <a:prstGeom prst="rect">
+            <a:avLst/>
+          </a:prstGeom>
+          <a:noFill/>
+        </p:spPr>
+        <p:txBody>
+          <a:bodyPr wrap="square" rtlCol="0">
+            <a:spAutoFit/>
+          </a:bodyPr>
+          <a:lstStyle/>
+          <a:p>
+            <a:pPr algn="ctr"/>
+            <a:r>
+              <a:rPr lang="en-US" sz="1400" dirty="0" smtClean="0"/>
+              <a:t>GW pumping rate </a:t>
+            </a:r>
+            <a:r>
+              <a:rPr lang="en-US" sz="1400" dirty="0"/>
+              <a:t>set as Irrigation demand, and limited by </a:t>
+            </a:r>
+            <a:r>
+              <a:rPr lang="en-US" sz="1400" dirty="0" smtClean="0"/>
+              <a:t>AGO input “Q”</a:t>
+            </a:r>
+            <a:endParaRPr lang="en-US" sz="1400" dirty="0"/>
+          </a:p>
+        </p:txBody>
+      </p:sp>
+      <p:sp>
+        <p:nvSpPr>
+          <p:cNvPr id="66" name="Rectangle 65"/>
+          <p:cNvSpPr/>
+          <p:nvPr/>
+        </p:nvSpPr>
+        <p:spPr>
+          <a:xfrm>
+            <a:off x="2323623" y="6125934"/>
+            <a:ext cx="2286000" cy="515716"/>
+          </a:xfrm>
+          <a:prstGeom prst="rect">
+            <a:avLst/>
+          </a:prstGeom>
+          <a:noFill/>
+          <a:ln>
+            <a:solidFill>
+              <a:schemeClr val="tx1"/>
+            </a:solidFill>
+          </a:ln>
+        </p:spPr>
+        <p:style>
+          <a:lnRef idx="2">
+            <a:schemeClr val="accent1">
+              <a:shade val="50000"/>
+            </a:schemeClr>
+          </a:lnRef>
+          <a:fillRef idx="1">
+            <a:schemeClr val="accent1"/>
+          </a:fillRef>
+          <a:effectRef idx="0">
+            <a:schemeClr val="accent1"/>
+          </a:effectRef>
+          <a:fontRef idx="minor">
+            <a:schemeClr val="lt1"/>
+          </a:fontRef>
+        </p:style>
+        <p:txBody>
+          <a:bodyPr rtlCol="0" anchor="ctr"/>
+          <a:lstStyle/>
+          <a:p>
+            <a:pPr algn="ctr"/>
+            <a:endParaRPr lang="en-US"/>
+          </a:p>
+        </p:txBody>
+      </p:sp>
+      <p:sp>
+        <p:nvSpPr>
+          <p:cNvPr id="67" name="TextBox 66"/>
+          <p:cNvSpPr txBox="1"/>
+          <p:nvPr/>
+        </p:nvSpPr>
+        <p:spPr>
+          <a:xfrm>
+            <a:off x="2114003" y="6124729"/>
+            <a:ext cx="2735317" cy="677108"/>
+          </a:xfrm>
+          <a:prstGeom prst="rect">
+            <a:avLst/>
+          </a:prstGeom>
+          <a:noFill/>
+        </p:spPr>
+        <p:txBody>
+          <a:bodyPr wrap="square" rtlCol="0">
+            <a:spAutoFit/>
+          </a:bodyPr>
+          <a:lstStyle/>
+          <a:p>
+            <a:pPr algn="ctr"/>
+            <a:r>
+              <a:rPr lang="en-US" sz="1400" dirty="0" smtClean="0"/>
+              <a:t>GW irrigation</a:t>
+            </a:r>
+          </a:p>
+          <a:p>
+            <a:pPr algn="ctr"/>
+            <a:r>
+              <a:rPr lang="en-US" sz="1000" dirty="0" smtClean="0"/>
+              <a:t>(IRRIGATIONWELL)</a:t>
+            </a:r>
+            <a:endParaRPr lang="en-US" sz="1000" dirty="0"/>
+          </a:p>
+          <a:p>
+            <a:pPr algn="ctr"/>
+            <a:endParaRPr lang="en-US" sz="1400" dirty="0"/>
+          </a:p>
+        </p:txBody>
+      </p:sp>
+      <p:sp>
+        <p:nvSpPr>
+          <p:cNvPr id="69" name="Rectangle 68"/>
+          <p:cNvSpPr/>
+          <p:nvPr/>
+        </p:nvSpPr>
+        <p:spPr>
+          <a:xfrm>
+            <a:off x="2323623" y="5139593"/>
+            <a:ext cx="2286000" cy="686324"/>
+          </a:xfrm>
+          <a:prstGeom prst="rect">
+            <a:avLst/>
+          </a:prstGeom>
+          <a:noFill/>
+          <a:ln>
+            <a:solidFill>
+              <a:schemeClr val="tx1"/>
+            </a:solidFill>
+          </a:ln>
+        </p:spPr>
+        <p:style>
+          <a:lnRef idx="2">
+            <a:schemeClr val="accent1">
+              <a:shade val="50000"/>
+            </a:schemeClr>
+          </a:lnRef>
+          <a:fillRef idx="1">
+            <a:schemeClr val="accent1"/>
+          </a:fillRef>
+          <a:effectRef idx="0">
+            <a:schemeClr val="accent1"/>
+          </a:effectRef>
+          <a:fontRef idx="minor">
+            <a:schemeClr val="lt1"/>
+          </a:fontRef>
+        </p:style>
+        <p:txBody>
+          <a:bodyPr rtlCol="0" anchor="ctr"/>
+          <a:lstStyle/>
+          <a:p>
+            <a:pPr algn="ctr"/>
+            <a:endParaRPr lang="en-US"/>
+          </a:p>
+        </p:txBody>
+      </p:sp>
+      <p:sp>
+        <p:nvSpPr>
+          <p:cNvPr id="70" name="TextBox 69"/>
+          <p:cNvSpPr txBox="1"/>
+          <p:nvPr/>
+        </p:nvSpPr>
+        <p:spPr>
+          <a:xfrm>
+            <a:off x="2339886" y="5148808"/>
+            <a:ext cx="2300558" cy="677108"/>
+          </a:xfrm>
+          <a:prstGeom prst="rect">
+            <a:avLst/>
+          </a:prstGeom>
+          <a:noFill/>
+        </p:spPr>
+        <p:txBody>
+          <a:bodyPr wrap="square" rtlCol="0">
+            <a:spAutoFit/>
+          </a:bodyPr>
+          <a:lstStyle/>
+          <a:p>
+            <a:pPr algn="ctr"/>
+            <a:r>
+              <a:rPr lang="en-US" sz="1400" dirty="0" smtClean="0"/>
+              <a:t>GW Demand </a:t>
+            </a:r>
+            <a:r>
+              <a:rPr lang="en-US" sz="1400" dirty="0" smtClean="0"/>
+              <a:t>set as SW </a:t>
+            </a:r>
+            <a:r>
+              <a:rPr lang="en-US" sz="1400" dirty="0" smtClean="0"/>
+              <a:t>shortfall</a:t>
+            </a:r>
+          </a:p>
+          <a:p>
+            <a:pPr algn="ctr"/>
+            <a:r>
+              <a:rPr lang="en-US" sz="1000" dirty="0" smtClean="0"/>
+              <a:t>(SUPPLEMENTALWELL)</a:t>
+            </a:r>
+            <a:endParaRPr lang="en-US" sz="1000" dirty="0"/>
+          </a:p>
+        </p:txBody>
+      </p:sp>
+      <p:cxnSp>
+        <p:nvCxnSpPr>
+          <p:cNvPr id="71" name="Straight Arrow Connector 70"/>
+          <p:cNvCxnSpPr/>
+          <p:nvPr/>
+        </p:nvCxnSpPr>
+        <p:spPr>
+          <a:xfrm>
+            <a:off x="3490165" y="5825916"/>
+            <a:ext cx="0" cy="304371"/>
+          </a:xfrm>
+          <a:prstGeom prst="straightConnector1">
+            <a:avLst/>
+          </a:prstGeom>
+          <a:ln w="19050">
+            <a:solidFill>
+              <a:schemeClr val="tx1"/>
+            </a:solidFill>
+            <a:headEnd type="none" w="med" len="med"/>
+            <a:tailEnd type="triangle" w="med" len="med"/>
+          </a:ln>
+        </p:spPr>
+        <p:style>
+          <a:lnRef idx="1">
+            <a:schemeClr val="accent1"/>
+          </a:lnRef>
+          <a:fillRef idx="0">
+            <a:schemeClr val="accent1"/>
+          </a:fillRef>
+          <a:effectRef idx="0">
+            <a:schemeClr val="accent1"/>
+          </a:effectRef>
+          <a:fontRef idx="minor">
+            <a:schemeClr val="tx1"/>
+          </a:fontRef>
+        </p:style>
+      </p:cxnSp>
+      <p:cxnSp>
+        <p:nvCxnSpPr>
+          <p:cNvPr id="74" name="Straight Arrow Connector 73"/>
+          <p:cNvCxnSpPr/>
+          <p:nvPr/>
+        </p:nvCxnSpPr>
+        <p:spPr>
+          <a:xfrm flipV="1">
+            <a:off x="4531904" y="3318987"/>
+            <a:ext cx="547653" cy="0"/>
+          </a:xfrm>
+          <a:prstGeom prst="straightConnector1">
+            <a:avLst/>
+          </a:prstGeom>
+          <a:ln w="19050">
+            <a:solidFill>
+              <a:schemeClr val="tx1"/>
+            </a:solidFill>
+            <a:tailEnd type="triangle"/>
+          </a:ln>
+        </p:spPr>
+        <p:style>
+          <a:lnRef idx="1">
+            <a:schemeClr val="accent1"/>
+          </a:lnRef>
+          <a:fillRef idx="0">
+            <a:schemeClr val="accent1"/>
+          </a:fillRef>
+          <a:effectRef idx="0">
+            <a:schemeClr val="accent1"/>
+          </a:effectRef>
+          <a:fontRef idx="minor">
+            <a:schemeClr val="tx1"/>
+          </a:fontRef>
+        </p:style>
+      </p:cxnSp>
+      <p:sp>
+        <p:nvSpPr>
+          <p:cNvPr id="75" name="TextBox 74"/>
+          <p:cNvSpPr txBox="1"/>
+          <p:nvPr/>
+        </p:nvSpPr>
+        <p:spPr>
+          <a:xfrm>
+            <a:off x="4473596" y="2947134"/>
+            <a:ext cx="1098721" cy="276999"/>
+          </a:xfrm>
+          <a:prstGeom prst="rect">
+            <a:avLst/>
+          </a:prstGeom>
+          <a:noFill/>
+        </p:spPr>
+        <p:txBody>
+          <a:bodyPr wrap="square" rtlCol="0">
+            <a:spAutoFit/>
+          </a:bodyPr>
+          <a:lstStyle/>
+          <a:p>
+            <a:r>
+              <a:rPr lang="en-US" sz="1200" dirty="0" smtClean="0"/>
+              <a:t>No SW</a:t>
+            </a:r>
+            <a:endParaRPr lang="en-US" sz="1200" dirty="0"/>
+          </a:p>
+        </p:txBody>
+      </p:sp>
     </p:spTree>
     <p:extLst>
       <p:ext uri="{BB962C8B-B14F-4D97-AF65-F5344CB8AC3E}">

</xml_diff>

<commit_message>
FIxes issue #13 (bug in SFR)
</commit_message>
<xml_diff>
--- a/Examples/AgOptions/Options.pptx
+++ b/Examples/AgOptions/Options.pptx
@@ -245,7 +245,7 @@
           <a:p>
             <a:fld id="{652F1E81-1D68-4626-9ECC-923EDADFDCD3}" type="datetimeFigureOut">
               <a:rPr lang="en-US" smtClean="0"/>
-              <a:t>10/20/2017</a:t>
+              <a:t>11/15/2017</a:t>
             </a:fld>
             <a:endParaRPr lang="en-US"/>
           </a:p>
@@ -415,7 +415,7 @@
           <a:p>
             <a:fld id="{652F1E81-1D68-4626-9ECC-923EDADFDCD3}" type="datetimeFigureOut">
               <a:rPr lang="en-US" smtClean="0"/>
-              <a:t>10/20/2017</a:t>
+              <a:t>11/15/2017</a:t>
             </a:fld>
             <a:endParaRPr lang="en-US"/>
           </a:p>
@@ -595,7 +595,7 @@
           <a:p>
             <a:fld id="{652F1E81-1D68-4626-9ECC-923EDADFDCD3}" type="datetimeFigureOut">
               <a:rPr lang="en-US" smtClean="0"/>
-              <a:t>10/20/2017</a:t>
+              <a:t>11/15/2017</a:t>
             </a:fld>
             <a:endParaRPr lang="en-US"/>
           </a:p>
@@ -765,7 +765,7 @@
           <a:p>
             <a:fld id="{652F1E81-1D68-4626-9ECC-923EDADFDCD3}" type="datetimeFigureOut">
               <a:rPr lang="en-US" smtClean="0"/>
-              <a:t>10/20/2017</a:t>
+              <a:t>11/15/2017</a:t>
             </a:fld>
             <a:endParaRPr lang="en-US"/>
           </a:p>
@@ -1011,7 +1011,7 @@
           <a:p>
             <a:fld id="{652F1E81-1D68-4626-9ECC-923EDADFDCD3}" type="datetimeFigureOut">
               <a:rPr lang="en-US" smtClean="0"/>
-              <a:t>10/20/2017</a:t>
+              <a:t>11/15/2017</a:t>
             </a:fld>
             <a:endParaRPr lang="en-US"/>
           </a:p>
@@ -1243,7 +1243,7 @@
           <a:p>
             <a:fld id="{652F1E81-1D68-4626-9ECC-923EDADFDCD3}" type="datetimeFigureOut">
               <a:rPr lang="en-US" smtClean="0"/>
-              <a:t>10/20/2017</a:t>
+              <a:t>11/15/2017</a:t>
             </a:fld>
             <a:endParaRPr lang="en-US"/>
           </a:p>
@@ -1610,7 +1610,7 @@
           <a:p>
             <a:fld id="{652F1E81-1D68-4626-9ECC-923EDADFDCD3}" type="datetimeFigureOut">
               <a:rPr lang="en-US" smtClean="0"/>
-              <a:t>10/20/2017</a:t>
+              <a:t>11/15/2017</a:t>
             </a:fld>
             <a:endParaRPr lang="en-US"/>
           </a:p>
@@ -1728,7 +1728,7 @@
           <a:p>
             <a:fld id="{652F1E81-1D68-4626-9ECC-923EDADFDCD3}" type="datetimeFigureOut">
               <a:rPr lang="en-US" smtClean="0"/>
-              <a:t>10/20/2017</a:t>
+              <a:t>11/15/2017</a:t>
             </a:fld>
             <a:endParaRPr lang="en-US"/>
           </a:p>
@@ -1823,7 +1823,7 @@
           <a:p>
             <a:fld id="{652F1E81-1D68-4626-9ECC-923EDADFDCD3}" type="datetimeFigureOut">
               <a:rPr lang="en-US" smtClean="0"/>
-              <a:t>10/20/2017</a:t>
+              <a:t>11/15/2017</a:t>
             </a:fld>
             <a:endParaRPr lang="en-US"/>
           </a:p>
@@ -2100,7 +2100,7 @@
           <a:p>
             <a:fld id="{652F1E81-1D68-4626-9ECC-923EDADFDCD3}" type="datetimeFigureOut">
               <a:rPr lang="en-US" smtClean="0"/>
-              <a:t>10/20/2017</a:t>
+              <a:t>11/15/2017</a:t>
             </a:fld>
             <a:endParaRPr lang="en-US"/>
           </a:p>
@@ -2353,7 +2353,7 @@
           <a:p>
             <a:fld id="{652F1E81-1D68-4626-9ECC-923EDADFDCD3}" type="datetimeFigureOut">
               <a:rPr lang="en-US" smtClean="0"/>
-              <a:t>10/20/2017</a:t>
+              <a:t>11/15/2017</a:t>
             </a:fld>
             <a:endParaRPr lang="en-US"/>
           </a:p>
@@ -2566,7 +2566,7 @@
           <a:p>
             <a:fld id="{652F1E81-1D68-4626-9ECC-923EDADFDCD3}" type="datetimeFigureOut">
               <a:rPr lang="en-US" smtClean="0"/>
-              <a:t>10/20/2017</a:t>
+              <a:t>11/15/2017</a:t>
             </a:fld>
             <a:endParaRPr lang="en-US"/>
           </a:p>
@@ -3089,15 +3089,7 @@
           <a:p>
             <a:r>
               <a:rPr lang="en-US" dirty="0" smtClean="0"/>
-              <a:t>A) Surface water (SW) </a:t>
-            </a:r>
-            <a:r>
-              <a:rPr lang="en-US" dirty="0" smtClean="0"/>
-              <a:t>irrigation </a:t>
-            </a:r>
-            <a:r>
-              <a:rPr lang="en-US" dirty="0" smtClean="0"/>
-              <a:t>using IRRIGATIONSEGMENT</a:t>
+              <a:t>A) Surface water (SW) irrigation using IRRIGATIONSEGMENT</a:t>
             </a:r>
             <a:endParaRPr lang="en-US" dirty="0"/>
           </a:p>
@@ -3298,15 +3290,7 @@
             </a:r>
             <a:r>
               <a:rPr lang="en-US" sz="1400" dirty="0" smtClean="0"/>
-              <a:t> </a:t>
-            </a:r>
-            <a:r>
-              <a:rPr lang="en-US" sz="1400" dirty="0" smtClean="0"/>
-              <a:t>calculated in AGO using efficiency </a:t>
-            </a:r>
-            <a:r>
-              <a:rPr lang="en-US" sz="1400" dirty="0" smtClean="0"/>
-              <a:t>factor</a:t>
+              <a:t> calculated in AGO using efficiency factor</a:t>
             </a:r>
           </a:p>
           <a:p>
@@ -3391,7 +3375,6 @@
               <a:rPr lang="en-US" sz="1400" dirty="0"/>
               <a:t>Return flows (SW+GW) calculated by UZF/PRMS</a:t>
             </a:r>
-            <a:endParaRPr lang="en-US" sz="1400" dirty="0"/>
           </a:p>
         </p:txBody>
       </p:sp>
@@ -3712,8 +3695,8 @@
         </p:nvSpPr>
         <p:spPr>
           <a:xfrm>
-            <a:off x="450916" y="109673"/>
-            <a:ext cx="2286000" cy="1160236"/>
+            <a:off x="315310" y="109673"/>
+            <a:ext cx="2506700" cy="1160236"/>
           </a:xfrm>
           <a:prstGeom prst="rect">
             <a:avLst/>
@@ -3782,7 +3765,23 @@
             <a:pPr algn="ctr"/>
             <a:r>
               <a:rPr lang="en-US" sz="1400" dirty="0"/>
-              <a:t>Demand set using SFR2 input variable “FLOW”</a:t>
+              <a:t>Demand set using </a:t>
+            </a:r>
+            <a:r>
+              <a:rPr lang="en-US" sz="1400" dirty="0" smtClean="0"/>
+              <a:t>SFR2 (</a:t>
+            </a:r>
+            <a:r>
+              <a:rPr lang="en-US" sz="1400" dirty="0" err="1" smtClean="0"/>
+              <a:t>Tabfiles</a:t>
+            </a:r>
+            <a:r>
+              <a:rPr lang="en-US" sz="1400" dirty="0" smtClean="0"/>
+              <a:t>) </a:t>
+            </a:r>
+            <a:r>
+              <a:rPr lang="en-US" sz="1400" dirty="0"/>
+              <a:t>input variable “FLOW”</a:t>
             </a:r>
           </a:p>
           <a:p>
@@ -3799,7 +3798,6 @@
               <a:rPr lang="en-US" sz="1000" dirty="0"/>
               <a:t>)</a:t>
             </a:r>
-            <a:endParaRPr lang="en-US" sz="1000" dirty="0"/>
           </a:p>
         </p:txBody>
       </p:sp>
@@ -3827,19 +3825,7 @@
           <a:p>
             <a:r>
               <a:rPr lang="en-US" dirty="0" smtClean="0"/>
-              <a:t>B) Surface water (SW) and groundwater (GW) </a:t>
-            </a:r>
-            <a:r>
-              <a:rPr lang="en-US" dirty="0" smtClean="0"/>
-              <a:t>irrigation </a:t>
-            </a:r>
-            <a:r>
-              <a:rPr lang="en-US" dirty="0" smtClean="0"/>
-              <a:t>using </a:t>
-            </a:r>
-            <a:r>
-              <a:rPr lang="en-US" dirty="0" smtClean="0"/>
-              <a:t>IRRIGATIONSEGMENT and IRRIGATIONWELL</a:t>
+              <a:t>B) Surface water (SW) and groundwater (GW) irrigation using IRRIGATIONSEGMENT and IRRIGATIONWELL</a:t>
             </a:r>
             <a:endParaRPr lang="en-US" dirty="0"/>
           </a:p>
@@ -3996,7 +3982,6 @@
               <a:rPr lang="en-US" sz="1400" dirty="0"/>
               <a:t>(IUZFBND&gt;0)</a:t>
             </a:r>
-            <a:endParaRPr lang="en-US" sz="1400" dirty="0"/>
           </a:p>
         </p:txBody>
       </p:sp>
@@ -4040,7 +4025,6 @@
               <a:rPr lang="en-US" sz="1400" dirty="0"/>
               <a:t>(IUZFBND&lt;0)</a:t>
             </a:r>
-            <a:endParaRPr lang="en-US" sz="1400" dirty="0"/>
           </a:p>
         </p:txBody>
       </p:sp>
@@ -4437,15 +4421,7 @@
               <a:pPr algn="ctr"/>
               <a:r>
                 <a:rPr lang="en-US" sz="1400" dirty="0" smtClean="0"/>
-                <a:t>Demand </a:t>
-              </a:r>
-              <a:r>
-                <a:rPr lang="en-US" sz="1400" dirty="0" smtClean="0"/>
-                <a:t>set using AGO input variable “Q</a:t>
-              </a:r>
-              <a:r>
-                <a:rPr lang="en-US" sz="1400" dirty="0" smtClean="0"/>
-                <a:t>”</a:t>
+                <a:t>Demand set using AGO input variable “Q”</a:t>
               </a:r>
             </a:p>
           </p:txBody>
@@ -4536,15 +4512,7 @@
               <a:pPr algn="ctr"/>
               <a:r>
                 <a:rPr lang="en-US" sz="1400" dirty="0" smtClean="0"/>
-                <a:t>GW Demand </a:t>
-              </a:r>
-              <a:r>
-                <a:rPr lang="en-US" sz="1400" dirty="0" smtClean="0"/>
-                <a:t>set as SW </a:t>
-              </a:r>
-              <a:r>
-                <a:rPr lang="en-US" sz="1400" dirty="0" smtClean="0"/>
-                <a:t>shortfall</a:t>
+                <a:t>GW Demand set as SW shortfall</a:t>
               </a:r>
             </a:p>
             <a:p>
@@ -4955,15 +4923,7 @@
             </a:r>
             <a:r>
               <a:rPr lang="en-US" sz="1400" dirty="0" smtClean="0"/>
-              <a:t>iversion set as Irrigation demand, and limited by the </a:t>
-            </a:r>
-            <a:r>
-              <a:rPr lang="en-US" sz="1400" dirty="0" smtClean="0"/>
-              <a:t>lesser </a:t>
-            </a:r>
-            <a:r>
-              <a:rPr lang="en-US" sz="1400" dirty="0" smtClean="0"/>
-              <a:t>of “FLOW” and </a:t>
+              <a:t>iversion set as Irrigation demand, and limited by the lesser of “FLOW” and </a:t>
             </a:r>
             <a:r>
               <a:rPr lang="en-US" sz="1400" dirty="0" err="1" smtClean="0"/>
@@ -4975,15 +4935,7 @@
             <a:pPr algn="ctr"/>
             <a:r>
               <a:rPr lang="en-US" sz="1000" dirty="0" smtClean="0"/>
-              <a:t>(</a:t>
-            </a:r>
-            <a:r>
-              <a:rPr lang="en-US" sz="1000" dirty="0" smtClean="0"/>
-              <a:t>IRRIGATIONSEGMENT</a:t>
-            </a:r>
-            <a:r>
-              <a:rPr lang="en-US" sz="1000" dirty="0" smtClean="0"/>
-              <a:t>)</a:t>
+              <a:t>(IRRIGATIONSEGMENT)</a:t>
             </a:r>
             <a:endParaRPr lang="en-US" sz="1000" dirty="0"/>
           </a:p>
@@ -5013,19 +4965,7 @@
           <a:p>
             <a:r>
               <a:rPr lang="en-US" dirty="0" smtClean="0"/>
-              <a:t>C) Surface water (SW) and groundwater (GW) </a:t>
-            </a:r>
-            <a:r>
-              <a:rPr lang="en-US" dirty="0" smtClean="0"/>
-              <a:t>irrigation using </a:t>
-            </a:r>
-            <a:r>
-              <a:rPr lang="en-US" dirty="0" smtClean="0"/>
-              <a:t>IRRIGATIONSEGMENT and IRRIGATIONWELL; demand calculated as ET </a:t>
-            </a:r>
-            <a:r>
-              <a:rPr lang="en-US" dirty="0" smtClean="0"/>
-              <a:t>deficit using ETDEMAND.</a:t>
+              <a:t>C) Surface water (SW) and groundwater (GW) irrigation using IRRIGATIONSEGMENT and IRRIGATIONWELL; demand calculated as ET deficit using ETDEMAND.</a:t>
             </a:r>
             <a:endParaRPr lang="en-US" dirty="0"/>
           </a:p>
@@ -5153,11 +5093,7 @@
               <a:pPr algn="ctr"/>
               <a:r>
                 <a:rPr lang="en-US" sz="1400" dirty="0" smtClean="0"/>
-                <a:t>Irrigation demand calculated using </a:t>
-              </a:r>
-              <a:r>
-                <a:rPr lang="en-US" sz="1400" dirty="0" smtClean="0"/>
-                <a:t>f(</a:t>
+                <a:t>Irrigation demand calculated using f(</a:t>
               </a:r>
               <a:r>
                 <a:rPr lang="en-US" sz="1400" dirty="0" err="1" smtClean="0"/>
@@ -5267,11 +5203,7 @@
             </a:r>
             <a:r>
               <a:rPr lang="en-US" sz="1400" dirty="0" smtClean="0"/>
-              <a:t> </a:t>
-            </a:r>
-            <a:r>
-              <a:rPr lang="en-US" sz="1400" dirty="0" smtClean="0"/>
-              <a:t>is calculated by UZF/PRMS</a:t>
+              <a:t> is calculated by UZF/PRMS</a:t>
             </a:r>
             <a:endParaRPr lang="en-US" sz="1400" dirty="0"/>
           </a:p>
@@ -5314,120 +5246,6 @@
           </a:fontRef>
         </p:style>
       </p:cxnSp>
-      <p:grpSp>
-        <p:nvGrpSpPr>
-          <p:cNvPr id="42" name="Group 41"/>
-          <p:cNvGrpSpPr/>
-          <p:nvPr/>
-        </p:nvGrpSpPr>
-        <p:grpSpPr>
-          <a:xfrm>
-            <a:off x="7527232" y="5848053"/>
-            <a:ext cx="2487723" cy="1074429"/>
-            <a:chOff x="2476728" y="3057301"/>
-            <a:chExt cx="2487723" cy="1074429"/>
-          </a:xfrm>
-        </p:grpSpPr>
-        <p:sp>
-          <p:nvSpPr>
-            <p:cNvPr id="46" name="Rectangle 45"/>
-            <p:cNvSpPr/>
-            <p:nvPr/>
-          </p:nvSpPr>
-          <p:spPr>
-            <a:xfrm>
-              <a:off x="2552826" y="3057301"/>
-              <a:ext cx="2286000" cy="859220"/>
-            </a:xfrm>
-            <a:prstGeom prst="rect">
-              <a:avLst/>
-            </a:prstGeom>
-            <a:noFill/>
-            <a:ln>
-              <a:solidFill>
-                <a:schemeClr val="tx1"/>
-              </a:solidFill>
-            </a:ln>
-          </p:spPr>
-          <p:style>
-            <a:lnRef idx="2">
-              <a:schemeClr val="accent1">
-                <a:shade val="50000"/>
-              </a:schemeClr>
-            </a:lnRef>
-            <a:fillRef idx="1">
-              <a:schemeClr val="accent1"/>
-            </a:fillRef>
-            <a:effectRef idx="0">
-              <a:schemeClr val="accent1"/>
-            </a:effectRef>
-            <a:fontRef idx="minor">
-              <a:schemeClr val="lt1"/>
-            </a:fontRef>
-          </p:style>
-          <p:txBody>
-            <a:bodyPr rtlCol="0" anchor="ctr"/>
-            <a:lstStyle/>
-            <a:p>
-              <a:pPr algn="ctr"/>
-              <a:endParaRPr lang="en-US"/>
-            </a:p>
-          </p:txBody>
-        </p:sp>
-        <p:sp>
-          <p:nvSpPr>
-            <p:cNvPr id="47" name="TextBox 46"/>
-            <p:cNvSpPr txBox="1"/>
-            <p:nvPr/>
-          </p:nvSpPr>
-          <p:spPr>
-            <a:xfrm>
-              <a:off x="2476728" y="3085290"/>
-              <a:ext cx="2487723" cy="1046440"/>
-            </a:xfrm>
-            <a:prstGeom prst="rect">
-              <a:avLst/>
-            </a:prstGeom>
-            <a:noFill/>
-          </p:spPr>
-          <p:txBody>
-            <a:bodyPr wrap="square" rtlCol="0">
-              <a:spAutoFit/>
-            </a:bodyPr>
-            <a:lstStyle/>
-            <a:p>
-              <a:pPr algn="ctr"/>
-              <a:r>
-                <a:rPr lang="en-US" sz="1400" dirty="0" smtClean="0"/>
-                <a:t>Supplemental GW pumping rate set as SW shortfall</a:t>
-              </a:r>
-            </a:p>
-            <a:p>
-              <a:pPr algn="ctr"/>
-              <a:r>
-                <a:rPr lang="en-US" sz="1000" dirty="0"/>
-                <a:t>(</a:t>
-              </a:r>
-              <a:r>
-                <a:rPr lang="en-US" sz="1000" dirty="0" smtClean="0"/>
-                <a:t>IRRIGATIONWELL)</a:t>
-              </a:r>
-            </a:p>
-            <a:p>
-              <a:pPr algn="ctr"/>
-              <a:r>
-                <a:rPr lang="en-US" sz="1000" dirty="0" smtClean="0"/>
-                <a:t>(SUPPLEMENTALWELL)</a:t>
-              </a:r>
-              <a:endParaRPr lang="en-US" sz="1000" dirty="0"/>
-            </a:p>
-            <a:p>
-              <a:pPr algn="ctr"/>
-              <a:endParaRPr lang="en-US" sz="1400" dirty="0"/>
-            </a:p>
-          </p:txBody>
-        </p:sp>
-      </p:grpSp>
       <p:cxnSp>
         <p:nvCxnSpPr>
           <p:cNvPr id="48" name="Straight Arrow Connector 47"/>
@@ -5474,7 +5292,7 @@
         <p:spPr>
           <a:xfrm>
             <a:off x="3490165" y="4805747"/>
-            <a:ext cx="1906997" cy="276999"/>
+            <a:ext cx="3761094" cy="276999"/>
           </a:xfrm>
           <a:prstGeom prst="rect">
             <a:avLst/>
@@ -5489,7 +5307,11 @@
           <a:p>
             <a:r>
               <a:rPr lang="en-US" sz="1200" dirty="0" smtClean="0"/>
-              <a:t>Diversion less than demand</a:t>
+              <a:t>Diversion less than </a:t>
+            </a:r>
+            <a:r>
+              <a:rPr lang="en-US" sz="1200" dirty="0" smtClean="0"/>
+              <a:t>demand with supplemental GW rights</a:t>
             </a:r>
             <a:endParaRPr lang="en-US" sz="1200" dirty="0"/>
           </a:p>
@@ -6285,15 +6107,7 @@
             <a:pPr algn="ctr"/>
             <a:r>
               <a:rPr lang="en-US" sz="1400" dirty="0" smtClean="0"/>
-              <a:t>GW Demand </a:t>
-            </a:r>
-            <a:r>
-              <a:rPr lang="en-US" sz="1400" dirty="0" smtClean="0"/>
-              <a:t>set as SW </a:t>
-            </a:r>
-            <a:r>
-              <a:rPr lang="en-US" sz="1400" dirty="0" smtClean="0"/>
-              <a:t>shortfall</a:t>
+              <a:t>GW Demand set as SW shortfall</a:t>
             </a:r>
           </a:p>
           <a:p>
@@ -6387,7 +6201,7 @@
         </p:nvSpPr>
         <p:spPr>
           <a:xfrm>
-            <a:off x="4473596" y="2947134"/>
+            <a:off x="4488970" y="3002777"/>
             <a:ext cx="1098721" cy="276999"/>
           </a:xfrm>
           <a:prstGeom prst="rect">
@@ -6404,6 +6218,36 @@
             <a:r>
               <a:rPr lang="en-US" sz="1200" dirty="0" smtClean="0"/>
               <a:t>No SW</a:t>
+            </a:r>
+            <a:endParaRPr lang="en-US" sz="1200" dirty="0"/>
+          </a:p>
+        </p:txBody>
+      </p:sp>
+      <p:sp>
+        <p:nvSpPr>
+          <p:cNvPr id="43" name="TextBox 42"/>
+          <p:cNvSpPr txBox="1"/>
+          <p:nvPr/>
+        </p:nvSpPr>
+        <p:spPr>
+          <a:xfrm>
+            <a:off x="4575439" y="3329944"/>
+            <a:ext cx="626658" cy="461665"/>
+          </a:xfrm>
+          <a:prstGeom prst="rect">
+            <a:avLst/>
+          </a:prstGeom>
+          <a:noFill/>
+        </p:spPr>
+        <p:txBody>
+          <a:bodyPr wrap="square" rtlCol="0">
+            <a:spAutoFit/>
+          </a:bodyPr>
+          <a:lstStyle/>
+          <a:p>
+            <a:r>
+              <a:rPr lang="en-US" sz="1200" dirty="0" smtClean="0"/>
+              <a:t>GW right</a:t>
             </a:r>
             <a:endParaRPr lang="en-US" sz="1200" dirty="0"/>
           </a:p>

</xml_diff>